<commit_message>
fixes on the dragndrop area
</commit_message>
<xml_diff>
--- a/Procesarea imaginilor.pptx
+++ b/Procesarea imaginilor.pptx
@@ -5,10 +5,10 @@
     <p:sldMasterId id="2147483648" r:id="rId1"/>
   </p:sldMasterIdLst>
   <p:notesMasterIdLst>
-    <p:notesMasterId r:id="rId24"/>
+    <p:notesMasterId r:id="rId27"/>
   </p:notesMasterIdLst>
   <p:handoutMasterIdLst>
-    <p:handoutMasterId r:id="rId25"/>
+    <p:handoutMasterId r:id="rId28"/>
   </p:handoutMasterIdLst>
   <p:sldIdLst>
     <p:sldId id="257" r:id="rId3"/>
@@ -21,17 +21,20 @@
     <p:sldId id="377" r:id="rId10"/>
     <p:sldId id="378" r:id="rId11"/>
     <p:sldId id="379" r:id="rId12"/>
-    <p:sldId id="315" r:id="rId13"/>
-    <p:sldId id="376" r:id="rId14"/>
-    <p:sldId id="380" r:id="rId15"/>
-    <p:sldId id="381" r:id="rId16"/>
-    <p:sldId id="382" r:id="rId17"/>
-    <p:sldId id="383" r:id="rId18"/>
-    <p:sldId id="316" r:id="rId19"/>
-    <p:sldId id="340" r:id="rId20"/>
-    <p:sldId id="330" r:id="rId21"/>
-    <p:sldId id="264" r:id="rId22"/>
-    <p:sldId id="284" r:id="rId23"/>
+    <p:sldId id="391" r:id="rId13"/>
+    <p:sldId id="315" r:id="rId14"/>
+    <p:sldId id="376" r:id="rId15"/>
+    <p:sldId id="380" r:id="rId16"/>
+    <p:sldId id="381" r:id="rId17"/>
+    <p:sldId id="382" r:id="rId18"/>
+    <p:sldId id="383" r:id="rId19"/>
+    <p:sldId id="393" r:id="rId20"/>
+    <p:sldId id="394" r:id="rId21"/>
+    <p:sldId id="316" r:id="rId22"/>
+    <p:sldId id="340" r:id="rId23"/>
+    <p:sldId id="330" r:id="rId24"/>
+    <p:sldId id="264" r:id="rId25"/>
+    <p:sldId id="284" r:id="rId26"/>
   </p:sldIdLst>
   <p:sldSz cx="12192000" cy="6858000"/>
   <p:notesSz cx="6858000" cy="9144000"/>
@@ -4447,6 +4450,99 @@
       <p:grpSpPr/>
       <p:sp>
         <p:nvSpPr>
+          <p:cNvPr id="2" name="Title 1"/>
+          <p:cNvSpPr>
+            <a:spLocks noGrp="1"/>
+          </p:cNvSpPr>
+          <p:nvPr>
+            <p:ph type="title"/>
+          </p:nvPr>
+        </p:nvSpPr>
+        <p:spPr>
+          <a:xfrm>
+            <a:off x="838200" y="227965"/>
+            <a:ext cx="10515600" cy="551815"/>
+          </a:xfrm>
+        </p:spPr>
+        <p:txBody>
+          <a:bodyPr/>
+          <a:p>
+            <a:r>
+              <a:rPr lang="en-US"/>
+              <a:t>Edge detection</a:t>
+            </a:r>
+            <a:endParaRPr lang="en-US"/>
+          </a:p>
+        </p:txBody>
+      </p:sp>
+      <p:pic>
+        <p:nvPicPr>
+          <p:cNvPr id="4" name="Picture 3" descr="2021_02_24_13_33_27_Procesarea_imaginilor"/>
+          <p:cNvPicPr>
+            <a:picLocks noChangeAspect="1"/>
+          </p:cNvPicPr>
+          <p:nvPr/>
+        </p:nvPicPr>
+        <p:blipFill>
+          <a:blip r:embed="rId1"/>
+          <a:stretch>
+            <a:fillRect/>
+          </a:stretch>
+        </p:blipFill>
+        <p:spPr>
+          <a:xfrm>
+            <a:off x="929640" y="780415"/>
+            <a:ext cx="7155815" cy="5297170"/>
+          </a:xfrm>
+          <a:prstGeom prst="rect">
+            <a:avLst/>
+          </a:prstGeom>
+        </p:spPr>
+      </p:pic>
+      <p:pic>
+        <p:nvPicPr>
+          <p:cNvPr id="5" name="Picture 4" descr="2021_02_24_13_34_13_Procesarea_imaginilor"/>
+          <p:cNvPicPr>
+            <a:picLocks noChangeAspect="1"/>
+          </p:cNvPicPr>
+          <p:nvPr/>
+        </p:nvPicPr>
+        <p:blipFill>
+          <a:blip r:embed="rId2"/>
+          <a:stretch>
+            <a:fillRect/>
+          </a:stretch>
+        </p:blipFill>
+        <p:spPr>
+          <a:xfrm>
+            <a:off x="4827905" y="1722120"/>
+            <a:ext cx="6525895" cy="4831080"/>
+          </a:xfrm>
+          <a:prstGeom prst="rect">
+            <a:avLst/>
+          </a:prstGeom>
+        </p:spPr>
+      </p:pic>
+    </p:spTree>
+  </p:cSld>
+  <p:clrMapOvr>
+    <a:masterClrMapping/>
+  </p:clrMapOvr>
+</p:sld>
+</file>
+
+<file path=ppt/slides/slide12.xml><?xml version="1.0" encoding="utf-8"?>
+<p:sld xmlns:a="http://schemas.openxmlformats.org/drawingml/2006/main" xmlns:r="http://schemas.openxmlformats.org/officeDocument/2006/relationships" xmlns:p="http://schemas.openxmlformats.org/presentationml/2006/main">
+  <p:cSld>
+    <p:spTree>
+      <p:nvGrpSpPr>
+        <p:cNvPr id="1" name=""/>
+        <p:cNvGrpSpPr/>
+        <p:nvPr/>
+      </p:nvGrpSpPr>
+      <p:grpSpPr/>
+      <p:sp>
+        <p:nvSpPr>
           <p:cNvPr id="4" name="椭圆 3"/>
           <p:cNvSpPr/>
           <p:nvPr/>
@@ -5178,7 +5274,7 @@
 </p:sld>
 </file>
 
-<file path=ppt/slides/slide12.xml><?xml version="1.0" encoding="utf-8"?>
+<file path=ppt/slides/slide13.xml><?xml version="1.0" encoding="utf-8"?>
 <p:sld xmlns:a="http://schemas.openxmlformats.org/drawingml/2006/main" xmlns:r="http://schemas.openxmlformats.org/officeDocument/2006/relationships" xmlns:p="http://schemas.openxmlformats.org/presentationml/2006/main">
   <p:cSld>
     <p:spTree>
@@ -5188,6 +5284,102 @@
         <p:nvPr/>
       </p:nvGrpSpPr>
       <p:grpSpPr/>
+      <p:pic>
+        <p:nvPicPr>
+          <p:cNvPr id="2" name="Picture 1" descr="2021_02_24_13_36_04_Procesarea_Imaginilor_Editor.fxml"/>
+          <p:cNvPicPr>
+            <a:picLocks noChangeAspect="1"/>
+          </p:cNvPicPr>
+          <p:nvPr/>
+        </p:nvPicPr>
+        <p:blipFill>
+          <a:blip r:embed="rId1"/>
+          <a:stretch>
+            <a:fillRect/>
+          </a:stretch>
+        </p:blipFill>
+        <p:spPr>
+          <a:xfrm>
+            <a:off x="911225" y="972185"/>
+            <a:ext cx="3073400" cy="4492625"/>
+          </a:xfrm>
+          <a:prstGeom prst="rect">
+            <a:avLst/>
+          </a:prstGeom>
+        </p:spPr>
+      </p:pic>
+      <p:sp>
+        <p:nvSpPr>
+          <p:cNvPr id="3" name="Text Box 2"/>
+          <p:cNvSpPr txBox="1"/>
+          <p:nvPr/>
+        </p:nvSpPr>
+        <p:spPr>
+          <a:xfrm>
+            <a:off x="4559935" y="737870"/>
+            <a:ext cx="6962775" cy="4523105"/>
+          </a:xfrm>
+          <a:prstGeom prst="rect">
+            <a:avLst/>
+          </a:prstGeom>
+          <a:noFill/>
+        </p:spPr>
+        <p:txBody>
+          <a:bodyPr wrap="square" rtlCol="0">
+            <a:spAutoFit/>
+          </a:bodyPr>
+          <a:p>
+            <a:r>
+              <a:rPr lang="en-US"/>
+              <a:t>Proiectul consta in doua ferestre:</a:t>
+            </a:r>
+            <a:endParaRPr lang="en-US"/>
+          </a:p>
+          <a:p>
+            <a:endParaRPr lang="en-US"/>
+          </a:p>
+          <a:p>
+            <a:r>
+              <a:rPr lang="en-US"/>
+              <a:t>Prima fereastra, reprezentata de UI.fxml si UIController, permite incarcarea imagini asupra careia se aplica diversele filtre.</a:t>
+            </a:r>
+            <a:endParaRPr lang="en-US"/>
+          </a:p>
+          <a:p>
+            <a:endParaRPr lang="en-US"/>
+          </a:p>
+          <a:p>
+            <a:r>
+              <a:rPr lang="en-US"/>
+              <a:t>Cea de-a doua fereasta, reprezentata de Editor.fxml si Editor controller, este fereastra lansata in momentul in care utilizatorul alege optiunea de Edge detection.</a:t>
+            </a:r>
+            <a:endParaRPr lang="en-US"/>
+          </a:p>
+          <a:p>
+            <a:endParaRPr lang="en-US"/>
+          </a:p>
+          <a:p>
+            <a:r>
+              <a:rPr lang="en-US"/>
+              <a:t>Pentru Face detection si Gaussian blur, exista clase dedicate care se ocupa de procesare, iar ImageProcessingHelper contine metode accesate in contextul procesului de edge detection.</a:t>
+            </a:r>
+            <a:endParaRPr lang="en-US"/>
+          </a:p>
+          <a:p>
+            <a:endParaRPr lang="en-US"/>
+          </a:p>
+          <a:p>
+            <a:r>
+              <a:rPr lang="en-US"/>
+              <a:t>Algorithms.json contine kernelurile pentru diferitele tipuri de edge detection.</a:t>
+            </a:r>
+            <a:endParaRPr lang="en-US"/>
+          </a:p>
+          <a:p>
+            <a:endParaRPr lang="en-US"/>
+          </a:p>
+        </p:txBody>
+      </p:sp>
     </p:spTree>
   </p:cSld>
   <p:clrMapOvr>
@@ -5196,7 +5388,7 @@
 </p:sld>
 </file>
 
-<file path=ppt/slides/slide13.xml><?xml version="1.0" encoding="utf-8"?>
+<file path=ppt/slides/slide14.xml><?xml version="1.0" encoding="utf-8"?>
 <p:sld xmlns:a="http://schemas.openxmlformats.org/drawingml/2006/main" xmlns:r="http://schemas.openxmlformats.org/officeDocument/2006/relationships" xmlns:p="http://schemas.openxmlformats.org/presentationml/2006/main">
   <p:cSld>
     <p:spTree>
@@ -5295,7 +5487,7 @@
 </p:sld>
 </file>
 
-<file path=ppt/slides/slide14.xml><?xml version="1.0" encoding="utf-8"?>
+<file path=ppt/slides/slide15.xml><?xml version="1.0" encoding="utf-8"?>
 <p:sld xmlns:a="http://schemas.openxmlformats.org/drawingml/2006/main" xmlns:r="http://schemas.openxmlformats.org/officeDocument/2006/relationships" xmlns:p="http://schemas.openxmlformats.org/presentationml/2006/main">
   <p:cSld>
     <p:spTree>
@@ -5374,7 +5566,7 @@
 </p:sld>
 </file>
 
-<file path=ppt/slides/slide15.xml><?xml version="1.0" encoding="utf-8"?>
+<file path=ppt/slides/slide16.xml><?xml version="1.0" encoding="utf-8"?>
 <p:sld xmlns:a="http://schemas.openxmlformats.org/drawingml/2006/main" xmlns:r="http://schemas.openxmlformats.org/officeDocument/2006/relationships" xmlns:p="http://schemas.openxmlformats.org/presentationml/2006/main">
   <p:cSld>
     <p:spTree>
@@ -5663,7 +5855,7 @@
 </p:sld>
 </file>
 
-<file path=ppt/slides/slide16.xml><?xml version="1.0" encoding="utf-8"?>
+<file path=ppt/slides/slide17.xml><?xml version="1.0" encoding="utf-8"?>
 <p:sld xmlns:a="http://schemas.openxmlformats.org/drawingml/2006/main" xmlns:r="http://schemas.openxmlformats.org/officeDocument/2006/relationships" xmlns:p="http://schemas.openxmlformats.org/presentationml/2006/main">
   <p:cSld>
     <p:spTree>
@@ -6003,749 +6195,6 @@
 </p:sld>
 </file>
 
-<file path=ppt/slides/slide17.xml><?xml version="1.0" encoding="utf-8"?>
-<p:sld xmlns:a="http://schemas.openxmlformats.org/drawingml/2006/main" xmlns:r="http://schemas.openxmlformats.org/officeDocument/2006/relationships" xmlns:p="http://schemas.openxmlformats.org/presentationml/2006/main">
-  <p:cSld>
-    <p:spTree>
-      <p:nvGrpSpPr>
-        <p:cNvPr id="1" name=""/>
-        <p:cNvGrpSpPr/>
-        <p:nvPr/>
-      </p:nvGrpSpPr>
-      <p:grpSpPr/>
-      <p:sp>
-        <p:nvSpPr>
-          <p:cNvPr id="4" name="椭圆 3"/>
-          <p:cNvSpPr/>
-          <p:nvPr/>
-        </p:nvSpPr>
-        <p:spPr>
-          <a:xfrm>
-            <a:off x="8351838" y="4391025"/>
-            <a:ext cx="841375" cy="841375"/>
-          </a:xfrm>
-          <a:prstGeom prst="ellipse">
-            <a:avLst/>
-          </a:prstGeom>
-          <a:solidFill>
-            <a:srgbClr val="6A3C7C"/>
-          </a:solidFill>
-          <a:ln w="28575">
-            <a:solidFill>
-              <a:schemeClr val="bg1"/>
-            </a:solidFill>
-          </a:ln>
-          <a:effectLst>
-            <a:outerShdw blurRad="152400" dist="63500" dir="8100000" algn="tr" rotWithShape="0">
-              <a:prstClr val="black">
-                <a:alpha val="26000"/>
-              </a:prstClr>
-            </a:outerShdw>
-          </a:effectLst>
-        </p:spPr>
-        <p:style>
-          <a:lnRef idx="2">
-            <a:schemeClr val="accent1">
-              <a:shade val="50000"/>
-            </a:schemeClr>
-          </a:lnRef>
-          <a:fillRef idx="1">
-            <a:schemeClr val="accent1"/>
-          </a:fillRef>
-          <a:effectRef idx="0">
-            <a:schemeClr val="accent1"/>
-          </a:effectRef>
-          <a:fontRef idx="minor">
-            <a:schemeClr val="lt1"/>
-          </a:fontRef>
-        </p:style>
-        <p:txBody>
-          <a:bodyPr wrap="square" rtlCol="0" anchor="ctr">
-            <a:noAutofit/>
-          </a:bodyPr>
-          <a:lstStyle/>
-          <a:p>
-            <a:pPr marL="0" marR="0" lvl="0" indent="0" algn="ctr" defTabSz="914400" rtl="0" eaLnBrk="1" fontAlgn="auto" latinLnBrk="0" hangingPunct="1">
-              <a:lnSpc>
-                <a:spcPct val="100000"/>
-              </a:lnSpc>
-              <a:spcBef>
-                <a:spcPts val="0"/>
-              </a:spcBef>
-              <a:spcAft>
-                <a:spcPts val="0"/>
-              </a:spcAft>
-              <a:buClrTx/>
-              <a:buSzTx/>
-              <a:buFontTx/>
-              <a:buNone/>
-              <a:defRPr/>
-            </a:pPr>
-            <a:endParaRPr kumimoji="0" lang="zh-CN" altLang="en-US" sz="3190" b="0" i="0" u="none" strike="noStrike" kern="1200" cap="none" spc="0" normalizeH="0" baseline="0" noProof="0">
-              <a:ln>
-                <a:noFill/>
-              </a:ln>
-              <a:solidFill>
-                <a:prstClr val="white"/>
-              </a:solidFill>
-              <a:effectLst/>
-              <a:uLnTx/>
-              <a:uFillTx/>
-              <a:latin typeface="+mn-lt"/>
-              <a:ea typeface="+mn-ea"/>
-              <a:cs typeface="Calibri" panose="020F0502020204030204" pitchFamily="34" charset="0"/>
-            </a:endParaRPr>
-          </a:p>
-        </p:txBody>
-      </p:sp>
-      <p:sp>
-        <p:nvSpPr>
-          <p:cNvPr id="6" name="椭圆 5"/>
-          <p:cNvSpPr/>
-          <p:nvPr/>
-        </p:nvSpPr>
-        <p:spPr>
-          <a:xfrm>
-            <a:off x="8923338" y="4132263"/>
-            <a:ext cx="517525" cy="517525"/>
-          </a:xfrm>
-          <a:prstGeom prst="ellipse">
-            <a:avLst/>
-          </a:prstGeom>
-          <a:solidFill>
-            <a:srgbClr val="FFBF53"/>
-          </a:solidFill>
-          <a:ln w="28575">
-            <a:solidFill>
-              <a:schemeClr val="bg1"/>
-            </a:solidFill>
-          </a:ln>
-          <a:effectLst>
-            <a:outerShdw blurRad="152400" dist="63500" dir="8100000" algn="tr" rotWithShape="0">
-              <a:prstClr val="black">
-                <a:alpha val="26000"/>
-              </a:prstClr>
-            </a:outerShdw>
-          </a:effectLst>
-        </p:spPr>
-        <p:style>
-          <a:lnRef idx="2">
-            <a:schemeClr val="accent1">
-              <a:shade val="50000"/>
-            </a:schemeClr>
-          </a:lnRef>
-          <a:fillRef idx="1">
-            <a:schemeClr val="accent1"/>
-          </a:fillRef>
-          <a:effectRef idx="0">
-            <a:schemeClr val="accent1"/>
-          </a:effectRef>
-          <a:fontRef idx="minor">
-            <a:schemeClr val="lt1"/>
-          </a:fontRef>
-        </p:style>
-        <p:txBody>
-          <a:bodyPr wrap="square" rtlCol="0" anchor="ctr">
-            <a:noAutofit/>
-          </a:bodyPr>
-          <a:lstStyle/>
-          <a:p>
-            <a:pPr marL="0" marR="0" lvl="0" indent="0" algn="ctr" defTabSz="914400" rtl="0" eaLnBrk="1" fontAlgn="auto" latinLnBrk="0" hangingPunct="1">
-              <a:lnSpc>
-                <a:spcPct val="100000"/>
-              </a:lnSpc>
-              <a:spcBef>
-                <a:spcPts val="0"/>
-              </a:spcBef>
-              <a:spcAft>
-                <a:spcPts val="0"/>
-              </a:spcAft>
-              <a:buClrTx/>
-              <a:buSzTx/>
-              <a:buFontTx/>
-              <a:buNone/>
-              <a:defRPr/>
-            </a:pPr>
-            <a:endParaRPr kumimoji="0" lang="zh-CN" altLang="en-US" sz="3190" b="0" i="0" u="none" strike="noStrike" kern="1200" cap="none" spc="0" normalizeH="0" baseline="0" noProof="0">
-              <a:ln>
-                <a:noFill/>
-              </a:ln>
-              <a:solidFill>
-                <a:prstClr val="white"/>
-              </a:solidFill>
-              <a:effectLst/>
-              <a:uLnTx/>
-              <a:uFillTx/>
-              <a:latin typeface="+mn-lt"/>
-              <a:ea typeface="+mn-ea"/>
-              <a:cs typeface="Calibri" panose="020F0502020204030204" pitchFamily="34" charset="0"/>
-            </a:endParaRPr>
-          </a:p>
-        </p:txBody>
-      </p:sp>
-      <p:sp>
-        <p:nvSpPr>
-          <p:cNvPr id="7" name="椭圆 6"/>
-          <p:cNvSpPr/>
-          <p:nvPr/>
-        </p:nvSpPr>
-        <p:spPr>
-          <a:xfrm>
-            <a:off x="8178800" y="3921125"/>
-            <a:ext cx="346075" cy="346075"/>
-          </a:xfrm>
-          <a:prstGeom prst="ellipse">
-            <a:avLst/>
-          </a:prstGeom>
-          <a:solidFill>
-            <a:srgbClr val="F07474"/>
-          </a:solidFill>
-          <a:ln w="28575">
-            <a:solidFill>
-              <a:schemeClr val="bg1"/>
-            </a:solidFill>
-          </a:ln>
-          <a:effectLst>
-            <a:outerShdw blurRad="152400" dist="63500" dir="8100000" algn="tr" rotWithShape="0">
-              <a:prstClr val="black">
-                <a:alpha val="26000"/>
-              </a:prstClr>
-            </a:outerShdw>
-          </a:effectLst>
-        </p:spPr>
-        <p:style>
-          <a:lnRef idx="2">
-            <a:schemeClr val="accent1">
-              <a:shade val="50000"/>
-            </a:schemeClr>
-          </a:lnRef>
-          <a:fillRef idx="1">
-            <a:schemeClr val="accent1"/>
-          </a:fillRef>
-          <a:effectRef idx="0">
-            <a:schemeClr val="accent1"/>
-          </a:effectRef>
-          <a:fontRef idx="minor">
-            <a:schemeClr val="lt1"/>
-          </a:fontRef>
-        </p:style>
-        <p:txBody>
-          <a:bodyPr wrap="square" rtlCol="0" anchor="ctr">
-            <a:noAutofit/>
-          </a:bodyPr>
-          <a:lstStyle/>
-          <a:p>
-            <a:pPr marL="0" marR="0" lvl="0" indent="0" algn="ctr" defTabSz="914400" rtl="0" eaLnBrk="1" fontAlgn="auto" latinLnBrk="0" hangingPunct="1">
-              <a:lnSpc>
-                <a:spcPct val="100000"/>
-              </a:lnSpc>
-              <a:spcBef>
-                <a:spcPts val="0"/>
-              </a:spcBef>
-              <a:spcAft>
-                <a:spcPts val="0"/>
-              </a:spcAft>
-              <a:buClrTx/>
-              <a:buSzTx/>
-              <a:buFontTx/>
-              <a:buNone/>
-              <a:defRPr/>
-            </a:pPr>
-            <a:endParaRPr kumimoji="0" lang="zh-CN" altLang="en-US" sz="3190" b="0" i="0" u="none" strike="noStrike" kern="1200" cap="none" spc="0" normalizeH="0" baseline="0" noProof="0">
-              <a:ln>
-                <a:noFill/>
-              </a:ln>
-              <a:solidFill>
-                <a:prstClr val="white"/>
-              </a:solidFill>
-              <a:effectLst/>
-              <a:uLnTx/>
-              <a:uFillTx/>
-              <a:latin typeface="+mn-lt"/>
-              <a:ea typeface="+mn-ea"/>
-              <a:cs typeface="Calibri" panose="020F0502020204030204" pitchFamily="34" charset="0"/>
-            </a:endParaRPr>
-          </a:p>
-        </p:txBody>
-      </p:sp>
-      <p:sp>
-        <p:nvSpPr>
-          <p:cNvPr id="12" name="椭圆 11"/>
-          <p:cNvSpPr/>
-          <p:nvPr/>
-        </p:nvSpPr>
-        <p:spPr>
-          <a:xfrm>
-            <a:off x="4205288" y="1533525"/>
-            <a:ext cx="3748088" cy="3748088"/>
-          </a:xfrm>
-          <a:prstGeom prst="ellipse">
-            <a:avLst/>
-          </a:prstGeom>
-          <a:solidFill>
-            <a:srgbClr val="F07474"/>
-          </a:solidFill>
-          <a:ln w="28575">
-            <a:solidFill>
-              <a:schemeClr val="bg1"/>
-            </a:solidFill>
-          </a:ln>
-          <a:effectLst>
-            <a:outerShdw blurRad="152400" dist="63500" dir="8100000" algn="tr" rotWithShape="0">
-              <a:prstClr val="black">
-                <a:alpha val="26000"/>
-              </a:prstClr>
-            </a:outerShdw>
-          </a:effectLst>
-        </p:spPr>
-        <p:style>
-          <a:lnRef idx="2">
-            <a:schemeClr val="accent1">
-              <a:shade val="50000"/>
-            </a:schemeClr>
-          </a:lnRef>
-          <a:fillRef idx="1">
-            <a:schemeClr val="accent1"/>
-          </a:fillRef>
-          <a:effectRef idx="0">
-            <a:schemeClr val="accent1"/>
-          </a:effectRef>
-          <a:fontRef idx="minor">
-            <a:schemeClr val="lt1"/>
-          </a:fontRef>
-        </p:style>
-        <p:txBody>
-          <a:bodyPr wrap="square" rtlCol="0" anchor="ctr">
-            <a:noAutofit/>
-          </a:bodyPr>
-          <a:lstStyle/>
-          <a:p>
-            <a:pPr marL="0" marR="0" lvl="0" indent="0" algn="ctr" defTabSz="914400" rtl="0" eaLnBrk="1" fontAlgn="auto" latinLnBrk="0" hangingPunct="1">
-              <a:lnSpc>
-                <a:spcPct val="100000"/>
-              </a:lnSpc>
-              <a:spcBef>
-                <a:spcPts val="0"/>
-              </a:spcBef>
-              <a:spcAft>
-                <a:spcPts val="0"/>
-              </a:spcAft>
-              <a:buClrTx/>
-              <a:buSzTx/>
-              <a:buFontTx/>
-              <a:buNone/>
-              <a:defRPr/>
-            </a:pPr>
-            <a:endParaRPr kumimoji="0" lang="zh-CN" altLang="en-US" sz="3190" b="0" i="0" u="none" strike="noStrike" kern="1200" cap="none" spc="0" normalizeH="0" baseline="0" noProof="0">
-              <a:ln>
-                <a:noFill/>
-              </a:ln>
-              <a:solidFill>
-                <a:prstClr val="white"/>
-              </a:solidFill>
-              <a:effectLst/>
-              <a:uLnTx/>
-              <a:uFillTx/>
-              <a:latin typeface="+mn-lt"/>
-              <a:ea typeface="+mn-ea"/>
-              <a:cs typeface="Calibri" panose="020F0502020204030204" pitchFamily="34" charset="0"/>
-            </a:endParaRPr>
-          </a:p>
-        </p:txBody>
-      </p:sp>
-      <p:sp>
-        <p:nvSpPr>
-          <p:cNvPr id="5" name="椭圆 4"/>
-          <p:cNvSpPr/>
-          <p:nvPr/>
-        </p:nvSpPr>
-        <p:spPr>
-          <a:xfrm>
-            <a:off x="7480300" y="4310063"/>
-            <a:ext cx="601663" cy="603250"/>
-          </a:xfrm>
-          <a:prstGeom prst="ellipse">
-            <a:avLst/>
-          </a:prstGeom>
-          <a:solidFill>
-            <a:srgbClr val="02B3C5"/>
-          </a:solidFill>
-          <a:ln w="28575">
-            <a:solidFill>
-              <a:schemeClr val="bg1"/>
-            </a:solidFill>
-          </a:ln>
-          <a:effectLst>
-            <a:outerShdw blurRad="152400" dist="63500" dir="8100000" algn="tr" rotWithShape="0">
-              <a:prstClr val="black">
-                <a:alpha val="26000"/>
-              </a:prstClr>
-            </a:outerShdw>
-          </a:effectLst>
-        </p:spPr>
-        <p:style>
-          <a:lnRef idx="2">
-            <a:schemeClr val="accent1">
-              <a:shade val="50000"/>
-            </a:schemeClr>
-          </a:lnRef>
-          <a:fillRef idx="1">
-            <a:schemeClr val="accent1"/>
-          </a:fillRef>
-          <a:effectRef idx="0">
-            <a:schemeClr val="accent1"/>
-          </a:effectRef>
-          <a:fontRef idx="minor">
-            <a:schemeClr val="lt1"/>
-          </a:fontRef>
-        </p:style>
-        <p:txBody>
-          <a:bodyPr wrap="square" rtlCol="0" anchor="ctr">
-            <a:noAutofit/>
-          </a:bodyPr>
-          <a:lstStyle/>
-          <a:p>
-            <a:pPr marL="0" marR="0" lvl="0" indent="0" algn="ctr" defTabSz="914400" rtl="0" eaLnBrk="1" fontAlgn="auto" latinLnBrk="0" hangingPunct="1">
-              <a:lnSpc>
-                <a:spcPct val="100000"/>
-              </a:lnSpc>
-              <a:spcBef>
-                <a:spcPts val="0"/>
-              </a:spcBef>
-              <a:spcAft>
-                <a:spcPts val="0"/>
-              </a:spcAft>
-              <a:buClrTx/>
-              <a:buSzTx/>
-              <a:buFontTx/>
-              <a:buNone/>
-              <a:defRPr/>
-            </a:pPr>
-            <a:endParaRPr kumimoji="0" lang="zh-CN" altLang="en-US" sz="3190" b="0" i="0" u="none" strike="noStrike" kern="1200" cap="none" spc="0" normalizeH="0" baseline="0" noProof="0">
-              <a:ln>
-                <a:noFill/>
-              </a:ln>
-              <a:solidFill>
-                <a:prstClr val="white"/>
-              </a:solidFill>
-              <a:effectLst/>
-              <a:uLnTx/>
-              <a:uFillTx/>
-              <a:latin typeface="+mn-lt"/>
-              <a:ea typeface="+mn-ea"/>
-              <a:cs typeface="Calibri" panose="020F0502020204030204" pitchFamily="34" charset="0"/>
-            </a:endParaRPr>
-          </a:p>
-        </p:txBody>
-      </p:sp>
-      <p:sp>
-        <p:nvSpPr>
-          <p:cNvPr id="13" name="椭圆 12"/>
-          <p:cNvSpPr/>
-          <p:nvPr/>
-        </p:nvSpPr>
-        <p:spPr>
-          <a:xfrm>
-            <a:off x="3606800" y="1685925"/>
-            <a:ext cx="528638" cy="528638"/>
-          </a:xfrm>
-          <a:prstGeom prst="ellipse">
-            <a:avLst/>
-          </a:prstGeom>
-          <a:solidFill>
-            <a:srgbClr val="F07474"/>
-          </a:solidFill>
-          <a:ln w="28575">
-            <a:solidFill>
-              <a:schemeClr val="bg1"/>
-            </a:solidFill>
-          </a:ln>
-          <a:effectLst>
-            <a:outerShdw blurRad="152400" dist="63500" dir="8100000" algn="tr" rotWithShape="0">
-              <a:prstClr val="black">
-                <a:alpha val="26000"/>
-              </a:prstClr>
-            </a:outerShdw>
-          </a:effectLst>
-        </p:spPr>
-        <p:style>
-          <a:lnRef idx="2">
-            <a:schemeClr val="accent1">
-              <a:shade val="50000"/>
-            </a:schemeClr>
-          </a:lnRef>
-          <a:fillRef idx="1">
-            <a:schemeClr val="accent1"/>
-          </a:fillRef>
-          <a:effectRef idx="0">
-            <a:schemeClr val="accent1"/>
-          </a:effectRef>
-          <a:fontRef idx="minor">
-            <a:schemeClr val="lt1"/>
-          </a:fontRef>
-        </p:style>
-        <p:txBody>
-          <a:bodyPr wrap="square" rtlCol="0" anchor="ctr">
-            <a:noAutofit/>
-          </a:bodyPr>
-          <a:lstStyle/>
-          <a:p>
-            <a:pPr marL="0" marR="0" lvl="0" indent="0" algn="ctr" defTabSz="914400" rtl="0" eaLnBrk="1" fontAlgn="auto" latinLnBrk="0" hangingPunct="1">
-              <a:lnSpc>
-                <a:spcPct val="100000"/>
-              </a:lnSpc>
-              <a:spcBef>
-                <a:spcPts val="0"/>
-              </a:spcBef>
-              <a:spcAft>
-                <a:spcPts val="0"/>
-              </a:spcAft>
-              <a:buClrTx/>
-              <a:buSzTx/>
-              <a:buFontTx/>
-              <a:buNone/>
-              <a:defRPr/>
-            </a:pPr>
-            <a:endParaRPr kumimoji="0" lang="zh-CN" altLang="en-US" sz="3190" b="0" i="0" u="none" strike="noStrike" kern="1200" cap="none" spc="0" normalizeH="0" baseline="0" noProof="0">
-              <a:ln>
-                <a:noFill/>
-              </a:ln>
-              <a:solidFill>
-                <a:prstClr val="white"/>
-              </a:solidFill>
-              <a:effectLst/>
-              <a:uLnTx/>
-              <a:uFillTx/>
-              <a:latin typeface="+mn-lt"/>
-              <a:ea typeface="+mn-ea"/>
-              <a:cs typeface="Calibri" panose="020F0502020204030204" pitchFamily="34" charset="0"/>
-            </a:endParaRPr>
-          </a:p>
-        </p:txBody>
-      </p:sp>
-      <p:sp>
-        <p:nvSpPr>
-          <p:cNvPr id="14" name="椭圆 13"/>
-          <p:cNvSpPr/>
-          <p:nvPr/>
-        </p:nvSpPr>
-        <p:spPr>
-          <a:xfrm>
-            <a:off x="3871913" y="2357438"/>
-            <a:ext cx="247650" cy="249238"/>
-          </a:xfrm>
-          <a:prstGeom prst="ellipse">
-            <a:avLst/>
-          </a:prstGeom>
-          <a:solidFill>
-            <a:srgbClr val="02B3C5"/>
-          </a:solidFill>
-          <a:ln w="28575">
-            <a:solidFill>
-              <a:schemeClr val="bg1"/>
-            </a:solidFill>
-          </a:ln>
-          <a:effectLst>
-            <a:outerShdw blurRad="152400" dist="63500" dir="8100000" algn="tr" rotWithShape="0">
-              <a:prstClr val="black">
-                <a:alpha val="26000"/>
-              </a:prstClr>
-            </a:outerShdw>
-          </a:effectLst>
-        </p:spPr>
-        <p:style>
-          <a:lnRef idx="2">
-            <a:schemeClr val="accent1">
-              <a:shade val="50000"/>
-            </a:schemeClr>
-          </a:lnRef>
-          <a:fillRef idx="1">
-            <a:schemeClr val="accent1"/>
-          </a:fillRef>
-          <a:effectRef idx="0">
-            <a:schemeClr val="accent1"/>
-          </a:effectRef>
-          <a:fontRef idx="minor">
-            <a:schemeClr val="lt1"/>
-          </a:fontRef>
-        </p:style>
-        <p:txBody>
-          <a:bodyPr wrap="square" rtlCol="0" anchor="ctr">
-            <a:noAutofit/>
-          </a:bodyPr>
-          <a:lstStyle/>
-          <a:p>
-            <a:pPr marL="0" marR="0" lvl="0" indent="0" algn="ctr" defTabSz="914400" rtl="0" eaLnBrk="1" fontAlgn="auto" latinLnBrk="0" hangingPunct="1">
-              <a:lnSpc>
-                <a:spcPct val="100000"/>
-              </a:lnSpc>
-              <a:spcBef>
-                <a:spcPts val="0"/>
-              </a:spcBef>
-              <a:spcAft>
-                <a:spcPts val="0"/>
-              </a:spcAft>
-              <a:buClrTx/>
-              <a:buSzTx/>
-              <a:buFontTx/>
-              <a:buNone/>
-              <a:defRPr/>
-            </a:pPr>
-            <a:endParaRPr kumimoji="0" lang="zh-CN" altLang="en-US" sz="3190" b="0" i="0" u="none" strike="noStrike" kern="1200" cap="none" spc="0" normalizeH="0" baseline="0" noProof="0">
-              <a:ln>
-                <a:noFill/>
-              </a:ln>
-              <a:solidFill>
-                <a:prstClr val="white"/>
-              </a:solidFill>
-              <a:effectLst/>
-              <a:uLnTx/>
-              <a:uFillTx/>
-              <a:latin typeface="+mn-lt"/>
-              <a:ea typeface="+mn-ea"/>
-              <a:cs typeface="Calibri" panose="020F0502020204030204" pitchFamily="34" charset="0"/>
-            </a:endParaRPr>
-          </a:p>
-        </p:txBody>
-      </p:sp>
-      <p:sp>
-        <p:nvSpPr>
-          <p:cNvPr id="15" name="椭圆 14"/>
-          <p:cNvSpPr/>
-          <p:nvPr/>
-        </p:nvSpPr>
-        <p:spPr>
-          <a:xfrm>
-            <a:off x="3381375" y="2170113"/>
-            <a:ext cx="187325" cy="187325"/>
-          </a:xfrm>
-          <a:prstGeom prst="ellipse">
-            <a:avLst/>
-          </a:prstGeom>
-          <a:solidFill>
-            <a:srgbClr val="6A3C7C"/>
-          </a:solidFill>
-          <a:ln w="28575">
-            <a:solidFill>
-              <a:schemeClr val="bg1"/>
-            </a:solidFill>
-          </a:ln>
-          <a:effectLst>
-            <a:outerShdw blurRad="152400" dist="63500" dir="8100000" algn="tr" rotWithShape="0">
-              <a:prstClr val="black">
-                <a:alpha val="26000"/>
-              </a:prstClr>
-            </a:outerShdw>
-          </a:effectLst>
-        </p:spPr>
-        <p:style>
-          <a:lnRef idx="2">
-            <a:schemeClr val="accent1">
-              <a:shade val="50000"/>
-            </a:schemeClr>
-          </a:lnRef>
-          <a:fillRef idx="1">
-            <a:schemeClr val="accent1"/>
-          </a:fillRef>
-          <a:effectRef idx="0">
-            <a:schemeClr val="accent1"/>
-          </a:effectRef>
-          <a:fontRef idx="minor">
-            <a:schemeClr val="lt1"/>
-          </a:fontRef>
-        </p:style>
-        <p:txBody>
-          <a:bodyPr wrap="square" rtlCol="0" anchor="ctr">
-            <a:noAutofit/>
-          </a:bodyPr>
-          <a:lstStyle/>
-          <a:p>
-            <a:pPr marL="0" marR="0" lvl="0" indent="0" algn="ctr" defTabSz="914400" rtl="0" eaLnBrk="1" fontAlgn="auto" latinLnBrk="0" hangingPunct="1">
-              <a:lnSpc>
-                <a:spcPct val="100000"/>
-              </a:lnSpc>
-              <a:spcBef>
-                <a:spcPts val="0"/>
-              </a:spcBef>
-              <a:spcAft>
-                <a:spcPts val="0"/>
-              </a:spcAft>
-              <a:buClrTx/>
-              <a:buSzTx/>
-              <a:buFontTx/>
-              <a:buNone/>
-              <a:defRPr/>
-            </a:pPr>
-            <a:endParaRPr kumimoji="0" lang="zh-CN" altLang="en-US" sz="3190" b="0" i="0" u="none" strike="noStrike" kern="1200" cap="none" spc="0" normalizeH="0" baseline="0" noProof="0">
-              <a:ln>
-                <a:noFill/>
-              </a:ln>
-              <a:solidFill>
-                <a:prstClr val="white"/>
-              </a:solidFill>
-              <a:effectLst/>
-              <a:uLnTx/>
-              <a:uFillTx/>
-              <a:latin typeface="+mn-lt"/>
-              <a:ea typeface="+mn-ea"/>
-              <a:cs typeface="Calibri" panose="020F0502020204030204" pitchFamily="34" charset="0"/>
-            </a:endParaRPr>
-          </a:p>
-        </p:txBody>
-      </p:sp>
-      <p:sp>
-        <p:nvSpPr>
-          <p:cNvPr id="14345" name="文本框 15"/>
-          <p:cNvSpPr txBox="1"/>
-          <p:nvPr/>
-        </p:nvSpPr>
-        <p:spPr>
-          <a:xfrm>
-            <a:off x="4370070" y="2808605"/>
-            <a:ext cx="3583940" cy="1198880"/>
-          </a:xfrm>
-          <a:prstGeom prst="rect">
-            <a:avLst/>
-          </a:prstGeom>
-          <a:noFill/>
-          <a:ln w="9525">
-            <a:noFill/>
-          </a:ln>
-        </p:spPr>
-        <p:txBody>
-          <a:bodyPr wrap="square" anchor="t">
-            <a:spAutoFit/>
-          </a:bodyPr>
-          <a:p>
-            <a:pPr algn="ctr"/>
-            <a:r>
-              <a:rPr lang="en-US" sz="7200" dirty="0">
-                <a:solidFill>
-                  <a:schemeClr val="bg1"/>
-                </a:solidFill>
-                <a:ea typeface="SimSun" panose="02010600030101010101" pitchFamily="2" charset="-122"/>
-                <a:cs typeface="Calibri" panose="020F0502020204030204" pitchFamily="34" charset="0"/>
-              </a:rPr>
-              <a:t>Concluzii</a:t>
-            </a:r>
-            <a:endParaRPr lang="en-US" sz="7200" dirty="0">
-              <a:solidFill>
-                <a:schemeClr val="bg1"/>
-              </a:solidFill>
-              <a:ea typeface="SimSun" panose="02010600030101010101" pitchFamily="2" charset="-122"/>
-              <a:cs typeface="Calibri" panose="020F0502020204030204" pitchFamily="34" charset="0"/>
-            </a:endParaRPr>
-          </a:p>
-        </p:txBody>
-      </p:sp>
-    </p:spTree>
-  </p:cSld>
-  <p:clrMapOvr>
-    <a:masterClrMapping/>
-  </p:clrMapOvr>
-</p:sld>
-</file>
-
 <file path=ppt/slides/slide18.xml><?xml version="1.0" encoding="utf-8"?>
 <p:sld xmlns:a="http://schemas.openxmlformats.org/drawingml/2006/main" xmlns:r="http://schemas.openxmlformats.org/officeDocument/2006/relationships" xmlns:p="http://schemas.openxmlformats.org/presentationml/2006/main">
   <p:cSld>
@@ -6758,729 +6207,74 @@
       <p:grpSpPr/>
       <p:sp>
         <p:nvSpPr>
-          <p:cNvPr id="4" name="椭圆 3"/>
-          <p:cNvSpPr/>
-          <p:nvPr/>
+          <p:cNvPr id="2" name="Title 1"/>
+          <p:cNvSpPr>
+            <a:spLocks noGrp="1"/>
+          </p:cNvSpPr>
+          <p:nvPr>
+            <p:ph type="title"/>
+          </p:nvPr>
         </p:nvSpPr>
-        <p:spPr>
-          <a:xfrm>
-            <a:off x="8351838" y="4391025"/>
-            <a:ext cx="841375" cy="841375"/>
-          </a:xfrm>
-          <a:prstGeom prst="ellipse">
-            <a:avLst/>
-          </a:prstGeom>
-          <a:solidFill>
-            <a:srgbClr val="6A3C7C"/>
-          </a:solidFill>
-          <a:ln w="28575">
-            <a:solidFill>
-              <a:schemeClr val="bg1"/>
-            </a:solidFill>
-          </a:ln>
-          <a:effectLst>
-            <a:outerShdw blurRad="152400" dist="63500" dir="8100000" algn="tr" rotWithShape="0">
-              <a:prstClr val="black">
-                <a:alpha val="26000"/>
-              </a:prstClr>
-            </a:outerShdw>
-          </a:effectLst>
-        </p:spPr>
-        <p:style>
-          <a:lnRef idx="2">
-            <a:schemeClr val="accent1">
-              <a:shade val="50000"/>
-            </a:schemeClr>
-          </a:lnRef>
-          <a:fillRef idx="1">
-            <a:schemeClr val="accent1"/>
-          </a:fillRef>
-          <a:effectRef idx="0">
-            <a:schemeClr val="accent1"/>
-          </a:effectRef>
-          <a:fontRef idx="minor">
-            <a:schemeClr val="lt1"/>
-          </a:fontRef>
-        </p:style>
+        <p:spPr/>
         <p:txBody>
-          <a:bodyPr wrap="square" rtlCol="0" anchor="ctr">
-            <a:noAutofit/>
-          </a:bodyPr>
-          <a:lstStyle/>
-          <a:p>
-            <a:pPr marL="0" marR="0" lvl="0" indent="0" algn="ctr" defTabSz="914400" rtl="0" eaLnBrk="1" fontAlgn="auto" latinLnBrk="0" hangingPunct="1">
-              <a:lnSpc>
-                <a:spcPct val="100000"/>
-              </a:lnSpc>
-              <a:spcBef>
-                <a:spcPts val="0"/>
-              </a:spcBef>
-              <a:spcAft>
-                <a:spcPts val="0"/>
-              </a:spcAft>
-              <a:buClrTx/>
-              <a:buSzTx/>
-              <a:buFontTx/>
-              <a:buNone/>
-              <a:defRPr/>
-            </a:pPr>
-            <a:endParaRPr kumimoji="0" lang="zh-CN" altLang="en-US" sz="3190" b="0" i="0" u="none" strike="noStrike" kern="1200" cap="none" spc="0" normalizeH="0" baseline="0" noProof="0">
-              <a:ln>
-                <a:noFill/>
-              </a:ln>
-              <a:solidFill>
-                <a:prstClr val="white"/>
-              </a:solidFill>
-              <a:effectLst/>
-              <a:uLnTx/>
-              <a:uFillTx/>
-              <a:latin typeface="+mn-lt"/>
-              <a:ea typeface="+mn-ea"/>
-              <a:cs typeface="Calibri" panose="020F0502020204030204" pitchFamily="34" charset="0"/>
-            </a:endParaRPr>
+          <a:bodyPr/>
+          <a:p>
+            <a:r>
+              <a:rPr lang="en-US"/>
+              <a:t>Edge detection</a:t>
+            </a:r>
+            <a:endParaRPr lang="en-US"/>
           </a:p>
         </p:txBody>
       </p:sp>
-      <p:sp>
-        <p:nvSpPr>
-          <p:cNvPr id="6" name="椭圆 5"/>
-          <p:cNvSpPr/>
+      <p:pic>
+        <p:nvPicPr>
+          <p:cNvPr id="5" name="Picture 4" descr="2021_02_24_15_16_32_Procesarea_Imaginilor_ImageProcessingHelper"/>
+          <p:cNvPicPr>
+            <a:picLocks noChangeAspect="1"/>
+          </p:cNvPicPr>
           <p:nvPr/>
-        </p:nvSpPr>
+        </p:nvPicPr>
+        <p:blipFill>
+          <a:blip r:embed="rId1"/>
+          <a:stretch>
+            <a:fillRect/>
+          </a:stretch>
+        </p:blipFill>
         <p:spPr>
           <a:xfrm>
-            <a:off x="8923338" y="4132263"/>
-            <a:ext cx="517525" cy="517525"/>
-          </a:xfrm>
-          <a:prstGeom prst="ellipse">
-            <a:avLst/>
-          </a:prstGeom>
-          <a:solidFill>
-            <a:srgbClr val="FFBF53"/>
-          </a:solidFill>
-          <a:ln w="28575">
-            <a:solidFill>
-              <a:schemeClr val="bg1"/>
-            </a:solidFill>
-          </a:ln>
-          <a:effectLst>
-            <a:outerShdw blurRad="152400" dist="63500" dir="8100000" algn="tr" rotWithShape="0">
-              <a:prstClr val="black">
-                <a:alpha val="26000"/>
-              </a:prstClr>
-            </a:outerShdw>
-          </a:effectLst>
-        </p:spPr>
-        <p:style>
-          <a:lnRef idx="2">
-            <a:schemeClr val="accent1">
-              <a:shade val="50000"/>
-            </a:schemeClr>
-          </a:lnRef>
-          <a:fillRef idx="1">
-            <a:schemeClr val="accent1"/>
-          </a:fillRef>
-          <a:effectRef idx="0">
-            <a:schemeClr val="accent1"/>
-          </a:effectRef>
-          <a:fontRef idx="minor">
-            <a:schemeClr val="lt1"/>
-          </a:fontRef>
-        </p:style>
-        <p:txBody>
-          <a:bodyPr wrap="square" rtlCol="0" anchor="ctr">
-            <a:noAutofit/>
-          </a:bodyPr>
-          <a:lstStyle/>
-          <a:p>
-            <a:pPr marL="0" marR="0" lvl="0" indent="0" algn="ctr" defTabSz="914400" rtl="0" eaLnBrk="1" fontAlgn="auto" latinLnBrk="0" hangingPunct="1">
-              <a:lnSpc>
-                <a:spcPct val="100000"/>
-              </a:lnSpc>
-              <a:spcBef>
-                <a:spcPts val="0"/>
-              </a:spcBef>
-              <a:spcAft>
-                <a:spcPts val="0"/>
-              </a:spcAft>
-              <a:buClrTx/>
-              <a:buSzTx/>
-              <a:buFontTx/>
-              <a:buNone/>
-              <a:defRPr/>
-            </a:pPr>
-            <a:endParaRPr kumimoji="0" lang="zh-CN" altLang="en-US" sz="3190" b="0" i="0" u="none" strike="noStrike" kern="1200" cap="none" spc="0" normalizeH="0" baseline="0" noProof="0">
-              <a:ln>
-                <a:noFill/>
-              </a:ln>
-              <a:solidFill>
-                <a:prstClr val="white"/>
-              </a:solidFill>
-              <a:effectLst/>
-              <a:uLnTx/>
-              <a:uFillTx/>
-              <a:latin typeface="+mn-lt"/>
-              <a:ea typeface="+mn-ea"/>
-              <a:cs typeface="Calibri" panose="020F0502020204030204" pitchFamily="34" charset="0"/>
-            </a:endParaRPr>
-          </a:p>
-        </p:txBody>
-      </p:sp>
-      <p:sp>
-        <p:nvSpPr>
-          <p:cNvPr id="7" name="椭圆 6"/>
-          <p:cNvSpPr/>
-          <p:nvPr/>
-        </p:nvSpPr>
-        <p:spPr>
-          <a:xfrm>
-            <a:off x="8178800" y="3921125"/>
-            <a:ext cx="346075" cy="346075"/>
-          </a:xfrm>
-          <a:prstGeom prst="ellipse">
-            <a:avLst/>
-          </a:prstGeom>
-          <a:solidFill>
-            <a:srgbClr val="F07474"/>
-          </a:solidFill>
-          <a:ln w="28575">
-            <a:solidFill>
-              <a:schemeClr val="bg1"/>
-            </a:solidFill>
-          </a:ln>
-          <a:effectLst>
-            <a:outerShdw blurRad="152400" dist="63500" dir="8100000" algn="tr" rotWithShape="0">
-              <a:prstClr val="black">
-                <a:alpha val="26000"/>
-              </a:prstClr>
-            </a:outerShdw>
-          </a:effectLst>
-        </p:spPr>
-        <p:style>
-          <a:lnRef idx="2">
-            <a:schemeClr val="accent1">
-              <a:shade val="50000"/>
-            </a:schemeClr>
-          </a:lnRef>
-          <a:fillRef idx="1">
-            <a:schemeClr val="accent1"/>
-          </a:fillRef>
-          <a:effectRef idx="0">
-            <a:schemeClr val="accent1"/>
-          </a:effectRef>
-          <a:fontRef idx="minor">
-            <a:schemeClr val="lt1"/>
-          </a:fontRef>
-        </p:style>
-        <p:txBody>
-          <a:bodyPr wrap="square" rtlCol="0" anchor="ctr">
-            <a:noAutofit/>
-          </a:bodyPr>
-          <a:lstStyle/>
-          <a:p>
-            <a:pPr marL="0" marR="0" lvl="0" indent="0" algn="ctr" defTabSz="914400" rtl="0" eaLnBrk="1" fontAlgn="auto" latinLnBrk="0" hangingPunct="1">
-              <a:lnSpc>
-                <a:spcPct val="100000"/>
-              </a:lnSpc>
-              <a:spcBef>
-                <a:spcPts val="0"/>
-              </a:spcBef>
-              <a:spcAft>
-                <a:spcPts val="0"/>
-              </a:spcAft>
-              <a:buClrTx/>
-              <a:buSzTx/>
-              <a:buFontTx/>
-              <a:buNone/>
-              <a:defRPr/>
-            </a:pPr>
-            <a:endParaRPr kumimoji="0" lang="zh-CN" altLang="en-US" sz="3190" b="0" i="0" u="none" strike="noStrike" kern="1200" cap="none" spc="0" normalizeH="0" baseline="0" noProof="0">
-              <a:ln>
-                <a:noFill/>
-              </a:ln>
-              <a:solidFill>
-                <a:prstClr val="white"/>
-              </a:solidFill>
-              <a:effectLst/>
-              <a:uLnTx/>
-              <a:uFillTx/>
-              <a:latin typeface="+mn-lt"/>
-              <a:ea typeface="+mn-ea"/>
-              <a:cs typeface="Calibri" panose="020F0502020204030204" pitchFamily="34" charset="0"/>
-            </a:endParaRPr>
-          </a:p>
-        </p:txBody>
-      </p:sp>
-      <p:sp>
-        <p:nvSpPr>
-          <p:cNvPr id="12" name="椭圆 11"/>
-          <p:cNvSpPr/>
-          <p:nvPr/>
-        </p:nvSpPr>
-        <p:spPr>
-          <a:xfrm>
-            <a:off x="4205288" y="1533525"/>
-            <a:ext cx="3748088" cy="3748088"/>
-          </a:xfrm>
-          <a:prstGeom prst="ellipse">
-            <a:avLst/>
-          </a:prstGeom>
-          <a:solidFill>
-            <a:srgbClr val="F07474"/>
-          </a:solidFill>
-          <a:ln w="28575">
-            <a:solidFill>
-              <a:schemeClr val="bg1"/>
-            </a:solidFill>
-          </a:ln>
-          <a:effectLst>
-            <a:outerShdw blurRad="152400" dist="63500" dir="8100000" algn="tr" rotWithShape="0">
-              <a:prstClr val="black">
-                <a:alpha val="26000"/>
-              </a:prstClr>
-            </a:outerShdw>
-          </a:effectLst>
-        </p:spPr>
-        <p:style>
-          <a:lnRef idx="2">
-            <a:schemeClr val="accent1">
-              <a:shade val="50000"/>
-            </a:schemeClr>
-          </a:lnRef>
-          <a:fillRef idx="1">
-            <a:schemeClr val="accent1"/>
-          </a:fillRef>
-          <a:effectRef idx="0">
-            <a:schemeClr val="accent1"/>
-          </a:effectRef>
-          <a:fontRef idx="minor">
-            <a:schemeClr val="lt1"/>
-          </a:fontRef>
-        </p:style>
-        <p:txBody>
-          <a:bodyPr wrap="square" rtlCol="0" anchor="ctr">
-            <a:noAutofit/>
-          </a:bodyPr>
-          <a:lstStyle/>
-          <a:p>
-            <a:pPr marL="0" marR="0" lvl="0" indent="0" algn="ctr" defTabSz="914400" rtl="0" eaLnBrk="1" fontAlgn="auto" latinLnBrk="0" hangingPunct="1">
-              <a:lnSpc>
-                <a:spcPct val="100000"/>
-              </a:lnSpc>
-              <a:spcBef>
-                <a:spcPts val="0"/>
-              </a:spcBef>
-              <a:spcAft>
-                <a:spcPts val="0"/>
-              </a:spcAft>
-              <a:buClrTx/>
-              <a:buSzTx/>
-              <a:buFontTx/>
-              <a:buNone/>
-              <a:defRPr/>
-            </a:pPr>
-            <a:endParaRPr kumimoji="0" lang="zh-CN" altLang="en-US" sz="3190" b="0" i="0" u="none" strike="noStrike" kern="1200" cap="none" spc="0" normalizeH="0" baseline="0" noProof="0">
-              <a:ln>
-                <a:noFill/>
-              </a:ln>
-              <a:solidFill>
-                <a:prstClr val="white"/>
-              </a:solidFill>
-              <a:effectLst/>
-              <a:uLnTx/>
-              <a:uFillTx/>
-              <a:latin typeface="+mn-lt"/>
-              <a:ea typeface="+mn-ea"/>
-              <a:cs typeface="Calibri" panose="020F0502020204030204" pitchFamily="34" charset="0"/>
-            </a:endParaRPr>
-          </a:p>
-        </p:txBody>
-      </p:sp>
-      <p:sp>
-        <p:nvSpPr>
-          <p:cNvPr id="5" name="椭圆 4"/>
-          <p:cNvSpPr/>
-          <p:nvPr/>
-        </p:nvSpPr>
-        <p:spPr>
-          <a:xfrm>
-            <a:off x="7480300" y="4310063"/>
-            <a:ext cx="601663" cy="603250"/>
-          </a:xfrm>
-          <a:prstGeom prst="ellipse">
-            <a:avLst/>
-          </a:prstGeom>
-          <a:solidFill>
-            <a:srgbClr val="02B3C5"/>
-          </a:solidFill>
-          <a:ln w="28575">
-            <a:solidFill>
-              <a:schemeClr val="bg1"/>
-            </a:solidFill>
-          </a:ln>
-          <a:effectLst>
-            <a:outerShdw blurRad="152400" dist="63500" dir="8100000" algn="tr" rotWithShape="0">
-              <a:prstClr val="black">
-                <a:alpha val="26000"/>
-              </a:prstClr>
-            </a:outerShdw>
-          </a:effectLst>
-        </p:spPr>
-        <p:style>
-          <a:lnRef idx="2">
-            <a:schemeClr val="accent1">
-              <a:shade val="50000"/>
-            </a:schemeClr>
-          </a:lnRef>
-          <a:fillRef idx="1">
-            <a:schemeClr val="accent1"/>
-          </a:fillRef>
-          <a:effectRef idx="0">
-            <a:schemeClr val="accent1"/>
-          </a:effectRef>
-          <a:fontRef idx="minor">
-            <a:schemeClr val="lt1"/>
-          </a:fontRef>
-        </p:style>
-        <p:txBody>
-          <a:bodyPr wrap="square" rtlCol="0" anchor="ctr">
-            <a:noAutofit/>
-          </a:bodyPr>
-          <a:lstStyle/>
-          <a:p>
-            <a:pPr marL="0" marR="0" lvl="0" indent="0" algn="ctr" defTabSz="914400" rtl="0" eaLnBrk="1" fontAlgn="auto" latinLnBrk="0" hangingPunct="1">
-              <a:lnSpc>
-                <a:spcPct val="100000"/>
-              </a:lnSpc>
-              <a:spcBef>
-                <a:spcPts val="0"/>
-              </a:spcBef>
-              <a:spcAft>
-                <a:spcPts val="0"/>
-              </a:spcAft>
-              <a:buClrTx/>
-              <a:buSzTx/>
-              <a:buFontTx/>
-              <a:buNone/>
-              <a:defRPr/>
-            </a:pPr>
-            <a:endParaRPr kumimoji="0" lang="zh-CN" altLang="en-US" sz="3190" b="0" i="0" u="none" strike="noStrike" kern="1200" cap="none" spc="0" normalizeH="0" baseline="0" noProof="0">
-              <a:ln>
-                <a:noFill/>
-              </a:ln>
-              <a:solidFill>
-                <a:prstClr val="white"/>
-              </a:solidFill>
-              <a:effectLst/>
-              <a:uLnTx/>
-              <a:uFillTx/>
-              <a:latin typeface="+mn-lt"/>
-              <a:ea typeface="+mn-ea"/>
-              <a:cs typeface="Calibri" panose="020F0502020204030204" pitchFamily="34" charset="0"/>
-            </a:endParaRPr>
-          </a:p>
-        </p:txBody>
-      </p:sp>
-      <p:sp>
-        <p:nvSpPr>
-          <p:cNvPr id="13" name="椭圆 12"/>
-          <p:cNvSpPr/>
-          <p:nvPr/>
-        </p:nvSpPr>
-        <p:spPr>
-          <a:xfrm>
-            <a:off x="3606800" y="1685925"/>
-            <a:ext cx="528638" cy="528638"/>
-          </a:xfrm>
-          <a:prstGeom prst="ellipse">
-            <a:avLst/>
-          </a:prstGeom>
-          <a:solidFill>
-            <a:srgbClr val="F07474"/>
-          </a:solidFill>
-          <a:ln w="28575">
-            <a:solidFill>
-              <a:schemeClr val="bg1"/>
-            </a:solidFill>
-          </a:ln>
-          <a:effectLst>
-            <a:outerShdw blurRad="152400" dist="63500" dir="8100000" algn="tr" rotWithShape="0">
-              <a:prstClr val="black">
-                <a:alpha val="26000"/>
-              </a:prstClr>
-            </a:outerShdw>
-          </a:effectLst>
-        </p:spPr>
-        <p:style>
-          <a:lnRef idx="2">
-            <a:schemeClr val="accent1">
-              <a:shade val="50000"/>
-            </a:schemeClr>
-          </a:lnRef>
-          <a:fillRef idx="1">
-            <a:schemeClr val="accent1"/>
-          </a:fillRef>
-          <a:effectRef idx="0">
-            <a:schemeClr val="accent1"/>
-          </a:effectRef>
-          <a:fontRef idx="minor">
-            <a:schemeClr val="lt1"/>
-          </a:fontRef>
-        </p:style>
-        <p:txBody>
-          <a:bodyPr wrap="square" rtlCol="0" anchor="ctr">
-            <a:noAutofit/>
-          </a:bodyPr>
-          <a:lstStyle/>
-          <a:p>
-            <a:pPr marL="0" marR="0" lvl="0" indent="0" algn="ctr" defTabSz="914400" rtl="0" eaLnBrk="1" fontAlgn="auto" latinLnBrk="0" hangingPunct="1">
-              <a:lnSpc>
-                <a:spcPct val="100000"/>
-              </a:lnSpc>
-              <a:spcBef>
-                <a:spcPts val="0"/>
-              </a:spcBef>
-              <a:spcAft>
-                <a:spcPts val="0"/>
-              </a:spcAft>
-              <a:buClrTx/>
-              <a:buSzTx/>
-              <a:buFontTx/>
-              <a:buNone/>
-              <a:defRPr/>
-            </a:pPr>
-            <a:endParaRPr kumimoji="0" lang="zh-CN" altLang="en-US" sz="3190" b="0" i="0" u="none" strike="noStrike" kern="1200" cap="none" spc="0" normalizeH="0" baseline="0" noProof="0">
-              <a:ln>
-                <a:noFill/>
-              </a:ln>
-              <a:solidFill>
-                <a:prstClr val="white"/>
-              </a:solidFill>
-              <a:effectLst/>
-              <a:uLnTx/>
-              <a:uFillTx/>
-              <a:latin typeface="+mn-lt"/>
-              <a:ea typeface="+mn-ea"/>
-              <a:cs typeface="Calibri" panose="020F0502020204030204" pitchFamily="34" charset="0"/>
-            </a:endParaRPr>
-          </a:p>
-        </p:txBody>
-      </p:sp>
-      <p:sp>
-        <p:nvSpPr>
-          <p:cNvPr id="14" name="椭圆 13"/>
-          <p:cNvSpPr/>
-          <p:nvPr/>
-        </p:nvSpPr>
-        <p:spPr>
-          <a:xfrm>
-            <a:off x="3871913" y="2357438"/>
-            <a:ext cx="247650" cy="249238"/>
-          </a:xfrm>
-          <a:prstGeom prst="ellipse">
-            <a:avLst/>
-          </a:prstGeom>
-          <a:solidFill>
-            <a:srgbClr val="02B3C5"/>
-          </a:solidFill>
-          <a:ln w="28575">
-            <a:solidFill>
-              <a:schemeClr val="bg1"/>
-            </a:solidFill>
-          </a:ln>
-          <a:effectLst>
-            <a:outerShdw blurRad="152400" dist="63500" dir="8100000" algn="tr" rotWithShape="0">
-              <a:prstClr val="black">
-                <a:alpha val="26000"/>
-              </a:prstClr>
-            </a:outerShdw>
-          </a:effectLst>
-        </p:spPr>
-        <p:style>
-          <a:lnRef idx="2">
-            <a:schemeClr val="accent1">
-              <a:shade val="50000"/>
-            </a:schemeClr>
-          </a:lnRef>
-          <a:fillRef idx="1">
-            <a:schemeClr val="accent1"/>
-          </a:fillRef>
-          <a:effectRef idx="0">
-            <a:schemeClr val="accent1"/>
-          </a:effectRef>
-          <a:fontRef idx="minor">
-            <a:schemeClr val="lt1"/>
-          </a:fontRef>
-        </p:style>
-        <p:txBody>
-          <a:bodyPr wrap="square" rtlCol="0" anchor="ctr">
-            <a:noAutofit/>
-          </a:bodyPr>
-          <a:lstStyle/>
-          <a:p>
-            <a:pPr marL="0" marR="0" lvl="0" indent="0" algn="ctr" defTabSz="914400" rtl="0" eaLnBrk="1" fontAlgn="auto" latinLnBrk="0" hangingPunct="1">
-              <a:lnSpc>
-                <a:spcPct val="100000"/>
-              </a:lnSpc>
-              <a:spcBef>
-                <a:spcPts val="0"/>
-              </a:spcBef>
-              <a:spcAft>
-                <a:spcPts val="0"/>
-              </a:spcAft>
-              <a:buClrTx/>
-              <a:buSzTx/>
-              <a:buFontTx/>
-              <a:buNone/>
-              <a:defRPr/>
-            </a:pPr>
-            <a:endParaRPr kumimoji="0" lang="zh-CN" altLang="en-US" sz="3190" b="0" i="0" u="none" strike="noStrike" kern="1200" cap="none" spc="0" normalizeH="0" baseline="0" noProof="0">
-              <a:ln>
-                <a:noFill/>
-              </a:ln>
-              <a:solidFill>
-                <a:prstClr val="white"/>
-              </a:solidFill>
-              <a:effectLst/>
-              <a:uLnTx/>
-              <a:uFillTx/>
-              <a:latin typeface="+mn-lt"/>
-              <a:ea typeface="+mn-ea"/>
-              <a:cs typeface="Calibri" panose="020F0502020204030204" pitchFamily="34" charset="0"/>
-            </a:endParaRPr>
-          </a:p>
-        </p:txBody>
-      </p:sp>
-      <p:sp>
-        <p:nvSpPr>
-          <p:cNvPr id="15" name="椭圆 14"/>
-          <p:cNvSpPr/>
-          <p:nvPr/>
-        </p:nvSpPr>
-        <p:spPr>
-          <a:xfrm>
-            <a:off x="3381375" y="2170113"/>
-            <a:ext cx="187325" cy="187325"/>
-          </a:xfrm>
-          <a:prstGeom prst="ellipse">
-            <a:avLst/>
-          </a:prstGeom>
-          <a:solidFill>
-            <a:srgbClr val="6A3C7C"/>
-          </a:solidFill>
-          <a:ln w="28575">
-            <a:solidFill>
-              <a:schemeClr val="bg1"/>
-            </a:solidFill>
-          </a:ln>
-          <a:effectLst>
-            <a:outerShdw blurRad="152400" dist="63500" dir="8100000" algn="tr" rotWithShape="0">
-              <a:prstClr val="black">
-                <a:alpha val="26000"/>
-              </a:prstClr>
-            </a:outerShdw>
-          </a:effectLst>
-        </p:spPr>
-        <p:style>
-          <a:lnRef idx="2">
-            <a:schemeClr val="accent1">
-              <a:shade val="50000"/>
-            </a:schemeClr>
-          </a:lnRef>
-          <a:fillRef idx="1">
-            <a:schemeClr val="accent1"/>
-          </a:fillRef>
-          <a:effectRef idx="0">
-            <a:schemeClr val="accent1"/>
-          </a:effectRef>
-          <a:fontRef idx="minor">
-            <a:schemeClr val="lt1"/>
-          </a:fontRef>
-        </p:style>
-        <p:txBody>
-          <a:bodyPr wrap="square" rtlCol="0" anchor="ctr">
-            <a:noAutofit/>
-          </a:bodyPr>
-          <a:lstStyle/>
-          <a:p>
-            <a:pPr marL="0" marR="0" lvl="0" indent="0" algn="ctr" defTabSz="914400" rtl="0" eaLnBrk="1" fontAlgn="auto" latinLnBrk="0" hangingPunct="1">
-              <a:lnSpc>
-                <a:spcPct val="100000"/>
-              </a:lnSpc>
-              <a:spcBef>
-                <a:spcPts val="0"/>
-              </a:spcBef>
-              <a:spcAft>
-                <a:spcPts val="0"/>
-              </a:spcAft>
-              <a:buClrTx/>
-              <a:buSzTx/>
-              <a:buFontTx/>
-              <a:buNone/>
-              <a:defRPr/>
-            </a:pPr>
-            <a:endParaRPr kumimoji="0" lang="zh-CN" altLang="en-US" sz="3190" b="0" i="0" u="none" strike="noStrike" kern="1200" cap="none" spc="0" normalizeH="0" baseline="0" noProof="0">
-              <a:ln>
-                <a:noFill/>
-              </a:ln>
-              <a:solidFill>
-                <a:prstClr val="white"/>
-              </a:solidFill>
-              <a:effectLst/>
-              <a:uLnTx/>
-              <a:uFillTx/>
-              <a:latin typeface="+mn-lt"/>
-              <a:ea typeface="+mn-ea"/>
-              <a:cs typeface="Calibri" panose="020F0502020204030204" pitchFamily="34" charset="0"/>
-            </a:endParaRPr>
-          </a:p>
-        </p:txBody>
-      </p:sp>
-      <p:sp>
-        <p:nvSpPr>
-          <p:cNvPr id="14345" name="文本框 15"/>
-          <p:cNvSpPr txBox="1"/>
-          <p:nvPr/>
-        </p:nvSpPr>
-        <p:spPr>
-          <a:xfrm>
-            <a:off x="4525645" y="2607310"/>
-            <a:ext cx="3140710" cy="1938020"/>
+            <a:off x="838200" y="1863090"/>
+            <a:ext cx="4591050" cy="3514725"/>
           </a:xfrm>
           <a:prstGeom prst="rect">
             <a:avLst/>
           </a:prstGeom>
-          <a:noFill/>
-          <a:ln w="9525">
-            <a:noFill/>
-          </a:ln>
-        </p:spPr>
-        <p:txBody>
-          <a:bodyPr wrap="square" anchor="t">
-            <a:spAutoFit/>
-          </a:bodyPr>
-          <a:p>
-            <a:pPr algn="ctr"/>
-            <a:r>
-              <a:rPr lang="en-US" sz="4000" dirty="0">
-                <a:solidFill>
-                  <a:schemeClr val="bg1"/>
-                </a:solidFill>
-                <a:ea typeface="SimSun" panose="02010600030101010101" pitchFamily="2" charset="-122"/>
-                <a:cs typeface="Calibri" panose="020F0502020204030204" pitchFamily="34" charset="0"/>
-              </a:rPr>
-              <a:t>Bibliografie si surse recomandate</a:t>
-            </a:r>
-            <a:endParaRPr lang="en-US" sz="4000" dirty="0">
-              <a:solidFill>
-                <a:schemeClr val="bg1"/>
-              </a:solidFill>
-              <a:ea typeface="SimSun" panose="02010600030101010101" pitchFamily="2" charset="-122"/>
-              <a:cs typeface="Calibri" panose="020F0502020204030204" pitchFamily="34" charset="0"/>
-            </a:endParaRPr>
-          </a:p>
-        </p:txBody>
-      </p:sp>
+        </p:spPr>
+      </p:pic>
+      <p:pic>
+        <p:nvPicPr>
+          <p:cNvPr id="6" name="Picture 5" descr="2021_02_24_15_21_11_Procesarea_Imaginilor_ImageProcessingHelper"/>
+          <p:cNvPicPr>
+            <a:picLocks noChangeAspect="1"/>
+          </p:cNvPicPr>
+          <p:nvPr/>
+        </p:nvPicPr>
+        <p:blipFill>
+          <a:blip r:embed="rId2"/>
+          <a:stretch>
+            <a:fillRect/>
+          </a:stretch>
+        </p:blipFill>
+        <p:spPr>
+          <a:xfrm>
+            <a:off x="5821680" y="2472690"/>
+            <a:ext cx="6019800" cy="2295525"/>
+          </a:xfrm>
+          <a:prstGeom prst="rect">
+            <a:avLst/>
+          </a:prstGeom>
+        </p:spPr>
+      </p:pic>
     </p:spTree>
   </p:cSld>
   <p:clrMapOvr>
@@ -7499,12 +6293,59 @@
         <p:nvPr/>
       </p:nvGrpSpPr>
       <p:grpSpPr/>
+      <p:pic>
+        <p:nvPicPr>
+          <p:cNvPr id="4" name="Picture 3" descr="2021_02_24_15_24_15_Procesarea_Imaginilor_Start"/>
+          <p:cNvPicPr>
+            <a:picLocks noChangeAspect="1"/>
+          </p:cNvPicPr>
+          <p:nvPr/>
+        </p:nvPicPr>
+        <p:blipFill>
+          <a:blip r:embed="rId1"/>
+          <a:stretch>
+            <a:fillRect/>
+          </a:stretch>
+        </p:blipFill>
+        <p:spPr>
+          <a:xfrm>
+            <a:off x="775335" y="798830"/>
+            <a:ext cx="7058025" cy="1952625"/>
+          </a:xfrm>
+          <a:prstGeom prst="rect">
+            <a:avLst/>
+          </a:prstGeom>
+        </p:spPr>
+      </p:pic>
+      <p:pic>
+        <p:nvPicPr>
+          <p:cNvPr id="5" name="Picture 4" descr="2021_02_24_15_23_41_Procesarea_Imaginilor_Start"/>
+          <p:cNvPicPr>
+            <a:picLocks noChangeAspect="1"/>
+          </p:cNvPicPr>
+          <p:nvPr/>
+        </p:nvPicPr>
+        <p:blipFill>
+          <a:blip r:embed="rId2"/>
+          <a:stretch>
+            <a:fillRect/>
+          </a:stretch>
+        </p:blipFill>
+        <p:spPr>
+          <a:xfrm>
+            <a:off x="3267710" y="3063875"/>
+            <a:ext cx="8648700" cy="3124200"/>
+          </a:xfrm>
+          <a:prstGeom prst="rect">
+            <a:avLst/>
+          </a:prstGeom>
+        </p:spPr>
+      </p:pic>
     </p:spTree>
   </p:cSld>
   <p:clrMapOvr>
     <a:masterClrMapping/>
   </p:clrMapOvr>
-  <p:transition/>
 </p:sld>
 </file>
 
@@ -8668,6 +7509,1511 @@
 </file>
 
 <file path=ppt/slides/slide20.xml><?xml version="1.0" encoding="utf-8"?>
+<p:sld xmlns:a="http://schemas.openxmlformats.org/drawingml/2006/main" xmlns:r="http://schemas.openxmlformats.org/officeDocument/2006/relationships" xmlns:p="http://schemas.openxmlformats.org/presentationml/2006/main">
+  <p:cSld>
+    <p:spTree>
+      <p:nvGrpSpPr>
+        <p:cNvPr id="1" name=""/>
+        <p:cNvGrpSpPr/>
+        <p:nvPr/>
+      </p:nvGrpSpPr>
+      <p:grpSpPr/>
+      <p:sp>
+        <p:nvSpPr>
+          <p:cNvPr id="4" name="椭圆 3"/>
+          <p:cNvSpPr/>
+          <p:nvPr/>
+        </p:nvSpPr>
+        <p:spPr>
+          <a:xfrm>
+            <a:off x="8351838" y="4391025"/>
+            <a:ext cx="841375" cy="841375"/>
+          </a:xfrm>
+          <a:prstGeom prst="ellipse">
+            <a:avLst/>
+          </a:prstGeom>
+          <a:solidFill>
+            <a:srgbClr val="6A3C7C"/>
+          </a:solidFill>
+          <a:ln w="28575">
+            <a:solidFill>
+              <a:schemeClr val="bg1"/>
+            </a:solidFill>
+          </a:ln>
+          <a:effectLst>
+            <a:outerShdw blurRad="152400" dist="63500" dir="8100000" algn="tr" rotWithShape="0">
+              <a:prstClr val="black">
+                <a:alpha val="26000"/>
+              </a:prstClr>
+            </a:outerShdw>
+          </a:effectLst>
+        </p:spPr>
+        <p:style>
+          <a:lnRef idx="2">
+            <a:schemeClr val="accent1">
+              <a:shade val="50000"/>
+            </a:schemeClr>
+          </a:lnRef>
+          <a:fillRef idx="1">
+            <a:schemeClr val="accent1"/>
+          </a:fillRef>
+          <a:effectRef idx="0">
+            <a:schemeClr val="accent1"/>
+          </a:effectRef>
+          <a:fontRef idx="minor">
+            <a:schemeClr val="lt1"/>
+          </a:fontRef>
+        </p:style>
+        <p:txBody>
+          <a:bodyPr wrap="square" rtlCol="0" anchor="ctr">
+            <a:noAutofit/>
+          </a:bodyPr>
+          <a:lstStyle/>
+          <a:p>
+            <a:pPr marL="0" marR="0" lvl="0" indent="0" algn="ctr" defTabSz="914400" rtl="0" eaLnBrk="1" fontAlgn="auto" latinLnBrk="0" hangingPunct="1">
+              <a:lnSpc>
+                <a:spcPct val="100000"/>
+              </a:lnSpc>
+              <a:spcBef>
+                <a:spcPts val="0"/>
+              </a:spcBef>
+              <a:spcAft>
+                <a:spcPts val="0"/>
+              </a:spcAft>
+              <a:buClrTx/>
+              <a:buSzTx/>
+              <a:buFontTx/>
+              <a:buNone/>
+              <a:defRPr/>
+            </a:pPr>
+            <a:endParaRPr kumimoji="0" lang="zh-CN" altLang="en-US" sz="3190" b="0" i="0" u="none" strike="noStrike" kern="1200" cap="none" spc="0" normalizeH="0" baseline="0" noProof="0">
+              <a:ln>
+                <a:noFill/>
+              </a:ln>
+              <a:solidFill>
+                <a:prstClr val="white"/>
+              </a:solidFill>
+              <a:effectLst/>
+              <a:uLnTx/>
+              <a:uFillTx/>
+              <a:latin typeface="+mn-lt"/>
+              <a:ea typeface="+mn-ea"/>
+              <a:cs typeface="Calibri" panose="020F0502020204030204" pitchFamily="34" charset="0"/>
+            </a:endParaRPr>
+          </a:p>
+        </p:txBody>
+      </p:sp>
+      <p:sp>
+        <p:nvSpPr>
+          <p:cNvPr id="6" name="椭圆 5"/>
+          <p:cNvSpPr/>
+          <p:nvPr/>
+        </p:nvSpPr>
+        <p:spPr>
+          <a:xfrm>
+            <a:off x="8923338" y="4132263"/>
+            <a:ext cx="517525" cy="517525"/>
+          </a:xfrm>
+          <a:prstGeom prst="ellipse">
+            <a:avLst/>
+          </a:prstGeom>
+          <a:solidFill>
+            <a:srgbClr val="FFBF53"/>
+          </a:solidFill>
+          <a:ln w="28575">
+            <a:solidFill>
+              <a:schemeClr val="bg1"/>
+            </a:solidFill>
+          </a:ln>
+          <a:effectLst>
+            <a:outerShdw blurRad="152400" dist="63500" dir="8100000" algn="tr" rotWithShape="0">
+              <a:prstClr val="black">
+                <a:alpha val="26000"/>
+              </a:prstClr>
+            </a:outerShdw>
+          </a:effectLst>
+        </p:spPr>
+        <p:style>
+          <a:lnRef idx="2">
+            <a:schemeClr val="accent1">
+              <a:shade val="50000"/>
+            </a:schemeClr>
+          </a:lnRef>
+          <a:fillRef idx="1">
+            <a:schemeClr val="accent1"/>
+          </a:fillRef>
+          <a:effectRef idx="0">
+            <a:schemeClr val="accent1"/>
+          </a:effectRef>
+          <a:fontRef idx="minor">
+            <a:schemeClr val="lt1"/>
+          </a:fontRef>
+        </p:style>
+        <p:txBody>
+          <a:bodyPr wrap="square" rtlCol="0" anchor="ctr">
+            <a:noAutofit/>
+          </a:bodyPr>
+          <a:lstStyle/>
+          <a:p>
+            <a:pPr marL="0" marR="0" lvl="0" indent="0" algn="ctr" defTabSz="914400" rtl="0" eaLnBrk="1" fontAlgn="auto" latinLnBrk="0" hangingPunct="1">
+              <a:lnSpc>
+                <a:spcPct val="100000"/>
+              </a:lnSpc>
+              <a:spcBef>
+                <a:spcPts val="0"/>
+              </a:spcBef>
+              <a:spcAft>
+                <a:spcPts val="0"/>
+              </a:spcAft>
+              <a:buClrTx/>
+              <a:buSzTx/>
+              <a:buFontTx/>
+              <a:buNone/>
+              <a:defRPr/>
+            </a:pPr>
+            <a:endParaRPr kumimoji="0" lang="zh-CN" altLang="en-US" sz="3190" b="0" i="0" u="none" strike="noStrike" kern="1200" cap="none" spc="0" normalizeH="0" baseline="0" noProof="0">
+              <a:ln>
+                <a:noFill/>
+              </a:ln>
+              <a:solidFill>
+                <a:prstClr val="white"/>
+              </a:solidFill>
+              <a:effectLst/>
+              <a:uLnTx/>
+              <a:uFillTx/>
+              <a:latin typeface="+mn-lt"/>
+              <a:ea typeface="+mn-ea"/>
+              <a:cs typeface="Calibri" panose="020F0502020204030204" pitchFamily="34" charset="0"/>
+            </a:endParaRPr>
+          </a:p>
+        </p:txBody>
+      </p:sp>
+      <p:sp>
+        <p:nvSpPr>
+          <p:cNvPr id="7" name="椭圆 6"/>
+          <p:cNvSpPr/>
+          <p:nvPr/>
+        </p:nvSpPr>
+        <p:spPr>
+          <a:xfrm>
+            <a:off x="8178800" y="3921125"/>
+            <a:ext cx="346075" cy="346075"/>
+          </a:xfrm>
+          <a:prstGeom prst="ellipse">
+            <a:avLst/>
+          </a:prstGeom>
+          <a:solidFill>
+            <a:srgbClr val="F07474"/>
+          </a:solidFill>
+          <a:ln w="28575">
+            <a:solidFill>
+              <a:schemeClr val="bg1"/>
+            </a:solidFill>
+          </a:ln>
+          <a:effectLst>
+            <a:outerShdw blurRad="152400" dist="63500" dir="8100000" algn="tr" rotWithShape="0">
+              <a:prstClr val="black">
+                <a:alpha val="26000"/>
+              </a:prstClr>
+            </a:outerShdw>
+          </a:effectLst>
+        </p:spPr>
+        <p:style>
+          <a:lnRef idx="2">
+            <a:schemeClr val="accent1">
+              <a:shade val="50000"/>
+            </a:schemeClr>
+          </a:lnRef>
+          <a:fillRef idx="1">
+            <a:schemeClr val="accent1"/>
+          </a:fillRef>
+          <a:effectRef idx="0">
+            <a:schemeClr val="accent1"/>
+          </a:effectRef>
+          <a:fontRef idx="minor">
+            <a:schemeClr val="lt1"/>
+          </a:fontRef>
+        </p:style>
+        <p:txBody>
+          <a:bodyPr wrap="square" rtlCol="0" anchor="ctr">
+            <a:noAutofit/>
+          </a:bodyPr>
+          <a:lstStyle/>
+          <a:p>
+            <a:pPr marL="0" marR="0" lvl="0" indent="0" algn="ctr" defTabSz="914400" rtl="0" eaLnBrk="1" fontAlgn="auto" latinLnBrk="0" hangingPunct="1">
+              <a:lnSpc>
+                <a:spcPct val="100000"/>
+              </a:lnSpc>
+              <a:spcBef>
+                <a:spcPts val="0"/>
+              </a:spcBef>
+              <a:spcAft>
+                <a:spcPts val="0"/>
+              </a:spcAft>
+              <a:buClrTx/>
+              <a:buSzTx/>
+              <a:buFontTx/>
+              <a:buNone/>
+              <a:defRPr/>
+            </a:pPr>
+            <a:endParaRPr kumimoji="0" lang="zh-CN" altLang="en-US" sz="3190" b="0" i="0" u="none" strike="noStrike" kern="1200" cap="none" spc="0" normalizeH="0" baseline="0" noProof="0">
+              <a:ln>
+                <a:noFill/>
+              </a:ln>
+              <a:solidFill>
+                <a:prstClr val="white"/>
+              </a:solidFill>
+              <a:effectLst/>
+              <a:uLnTx/>
+              <a:uFillTx/>
+              <a:latin typeface="+mn-lt"/>
+              <a:ea typeface="+mn-ea"/>
+              <a:cs typeface="Calibri" panose="020F0502020204030204" pitchFamily="34" charset="0"/>
+            </a:endParaRPr>
+          </a:p>
+        </p:txBody>
+      </p:sp>
+      <p:sp>
+        <p:nvSpPr>
+          <p:cNvPr id="12" name="椭圆 11"/>
+          <p:cNvSpPr/>
+          <p:nvPr/>
+        </p:nvSpPr>
+        <p:spPr>
+          <a:xfrm>
+            <a:off x="4205288" y="1533525"/>
+            <a:ext cx="3748088" cy="3748088"/>
+          </a:xfrm>
+          <a:prstGeom prst="ellipse">
+            <a:avLst/>
+          </a:prstGeom>
+          <a:solidFill>
+            <a:srgbClr val="F07474"/>
+          </a:solidFill>
+          <a:ln w="28575">
+            <a:solidFill>
+              <a:schemeClr val="bg1"/>
+            </a:solidFill>
+          </a:ln>
+          <a:effectLst>
+            <a:outerShdw blurRad="152400" dist="63500" dir="8100000" algn="tr" rotWithShape="0">
+              <a:prstClr val="black">
+                <a:alpha val="26000"/>
+              </a:prstClr>
+            </a:outerShdw>
+          </a:effectLst>
+        </p:spPr>
+        <p:style>
+          <a:lnRef idx="2">
+            <a:schemeClr val="accent1">
+              <a:shade val="50000"/>
+            </a:schemeClr>
+          </a:lnRef>
+          <a:fillRef idx="1">
+            <a:schemeClr val="accent1"/>
+          </a:fillRef>
+          <a:effectRef idx="0">
+            <a:schemeClr val="accent1"/>
+          </a:effectRef>
+          <a:fontRef idx="minor">
+            <a:schemeClr val="lt1"/>
+          </a:fontRef>
+        </p:style>
+        <p:txBody>
+          <a:bodyPr wrap="square" rtlCol="0" anchor="ctr">
+            <a:noAutofit/>
+          </a:bodyPr>
+          <a:lstStyle/>
+          <a:p>
+            <a:pPr marL="0" marR="0" lvl="0" indent="0" algn="ctr" defTabSz="914400" rtl="0" eaLnBrk="1" fontAlgn="auto" latinLnBrk="0" hangingPunct="1">
+              <a:lnSpc>
+                <a:spcPct val="100000"/>
+              </a:lnSpc>
+              <a:spcBef>
+                <a:spcPts val="0"/>
+              </a:spcBef>
+              <a:spcAft>
+                <a:spcPts val="0"/>
+              </a:spcAft>
+              <a:buClrTx/>
+              <a:buSzTx/>
+              <a:buFontTx/>
+              <a:buNone/>
+              <a:defRPr/>
+            </a:pPr>
+            <a:endParaRPr kumimoji="0" lang="zh-CN" altLang="en-US" sz="3190" b="0" i="0" u="none" strike="noStrike" kern="1200" cap="none" spc="0" normalizeH="0" baseline="0" noProof="0">
+              <a:ln>
+                <a:noFill/>
+              </a:ln>
+              <a:solidFill>
+                <a:prstClr val="white"/>
+              </a:solidFill>
+              <a:effectLst/>
+              <a:uLnTx/>
+              <a:uFillTx/>
+              <a:latin typeface="+mn-lt"/>
+              <a:ea typeface="+mn-ea"/>
+              <a:cs typeface="Calibri" panose="020F0502020204030204" pitchFamily="34" charset="0"/>
+            </a:endParaRPr>
+          </a:p>
+        </p:txBody>
+      </p:sp>
+      <p:sp>
+        <p:nvSpPr>
+          <p:cNvPr id="5" name="椭圆 4"/>
+          <p:cNvSpPr/>
+          <p:nvPr/>
+        </p:nvSpPr>
+        <p:spPr>
+          <a:xfrm>
+            <a:off x="7480300" y="4310063"/>
+            <a:ext cx="601663" cy="603250"/>
+          </a:xfrm>
+          <a:prstGeom prst="ellipse">
+            <a:avLst/>
+          </a:prstGeom>
+          <a:solidFill>
+            <a:srgbClr val="02B3C5"/>
+          </a:solidFill>
+          <a:ln w="28575">
+            <a:solidFill>
+              <a:schemeClr val="bg1"/>
+            </a:solidFill>
+          </a:ln>
+          <a:effectLst>
+            <a:outerShdw blurRad="152400" dist="63500" dir="8100000" algn="tr" rotWithShape="0">
+              <a:prstClr val="black">
+                <a:alpha val="26000"/>
+              </a:prstClr>
+            </a:outerShdw>
+          </a:effectLst>
+        </p:spPr>
+        <p:style>
+          <a:lnRef idx="2">
+            <a:schemeClr val="accent1">
+              <a:shade val="50000"/>
+            </a:schemeClr>
+          </a:lnRef>
+          <a:fillRef idx="1">
+            <a:schemeClr val="accent1"/>
+          </a:fillRef>
+          <a:effectRef idx="0">
+            <a:schemeClr val="accent1"/>
+          </a:effectRef>
+          <a:fontRef idx="minor">
+            <a:schemeClr val="lt1"/>
+          </a:fontRef>
+        </p:style>
+        <p:txBody>
+          <a:bodyPr wrap="square" rtlCol="0" anchor="ctr">
+            <a:noAutofit/>
+          </a:bodyPr>
+          <a:lstStyle/>
+          <a:p>
+            <a:pPr marL="0" marR="0" lvl="0" indent="0" algn="ctr" defTabSz="914400" rtl="0" eaLnBrk="1" fontAlgn="auto" latinLnBrk="0" hangingPunct="1">
+              <a:lnSpc>
+                <a:spcPct val="100000"/>
+              </a:lnSpc>
+              <a:spcBef>
+                <a:spcPts val="0"/>
+              </a:spcBef>
+              <a:spcAft>
+                <a:spcPts val="0"/>
+              </a:spcAft>
+              <a:buClrTx/>
+              <a:buSzTx/>
+              <a:buFontTx/>
+              <a:buNone/>
+              <a:defRPr/>
+            </a:pPr>
+            <a:endParaRPr kumimoji="0" lang="zh-CN" altLang="en-US" sz="3190" b="0" i="0" u="none" strike="noStrike" kern="1200" cap="none" spc="0" normalizeH="0" baseline="0" noProof="0">
+              <a:ln>
+                <a:noFill/>
+              </a:ln>
+              <a:solidFill>
+                <a:prstClr val="white"/>
+              </a:solidFill>
+              <a:effectLst/>
+              <a:uLnTx/>
+              <a:uFillTx/>
+              <a:latin typeface="+mn-lt"/>
+              <a:ea typeface="+mn-ea"/>
+              <a:cs typeface="Calibri" panose="020F0502020204030204" pitchFamily="34" charset="0"/>
+            </a:endParaRPr>
+          </a:p>
+        </p:txBody>
+      </p:sp>
+      <p:sp>
+        <p:nvSpPr>
+          <p:cNvPr id="13" name="椭圆 12"/>
+          <p:cNvSpPr/>
+          <p:nvPr/>
+        </p:nvSpPr>
+        <p:spPr>
+          <a:xfrm>
+            <a:off x="3606800" y="1685925"/>
+            <a:ext cx="528638" cy="528638"/>
+          </a:xfrm>
+          <a:prstGeom prst="ellipse">
+            <a:avLst/>
+          </a:prstGeom>
+          <a:solidFill>
+            <a:srgbClr val="F07474"/>
+          </a:solidFill>
+          <a:ln w="28575">
+            <a:solidFill>
+              <a:schemeClr val="bg1"/>
+            </a:solidFill>
+          </a:ln>
+          <a:effectLst>
+            <a:outerShdw blurRad="152400" dist="63500" dir="8100000" algn="tr" rotWithShape="0">
+              <a:prstClr val="black">
+                <a:alpha val="26000"/>
+              </a:prstClr>
+            </a:outerShdw>
+          </a:effectLst>
+        </p:spPr>
+        <p:style>
+          <a:lnRef idx="2">
+            <a:schemeClr val="accent1">
+              <a:shade val="50000"/>
+            </a:schemeClr>
+          </a:lnRef>
+          <a:fillRef idx="1">
+            <a:schemeClr val="accent1"/>
+          </a:fillRef>
+          <a:effectRef idx="0">
+            <a:schemeClr val="accent1"/>
+          </a:effectRef>
+          <a:fontRef idx="minor">
+            <a:schemeClr val="lt1"/>
+          </a:fontRef>
+        </p:style>
+        <p:txBody>
+          <a:bodyPr wrap="square" rtlCol="0" anchor="ctr">
+            <a:noAutofit/>
+          </a:bodyPr>
+          <a:lstStyle/>
+          <a:p>
+            <a:pPr marL="0" marR="0" lvl="0" indent="0" algn="ctr" defTabSz="914400" rtl="0" eaLnBrk="1" fontAlgn="auto" latinLnBrk="0" hangingPunct="1">
+              <a:lnSpc>
+                <a:spcPct val="100000"/>
+              </a:lnSpc>
+              <a:spcBef>
+                <a:spcPts val="0"/>
+              </a:spcBef>
+              <a:spcAft>
+                <a:spcPts val="0"/>
+              </a:spcAft>
+              <a:buClrTx/>
+              <a:buSzTx/>
+              <a:buFontTx/>
+              <a:buNone/>
+              <a:defRPr/>
+            </a:pPr>
+            <a:endParaRPr kumimoji="0" lang="zh-CN" altLang="en-US" sz="3190" b="0" i="0" u="none" strike="noStrike" kern="1200" cap="none" spc="0" normalizeH="0" baseline="0" noProof="0">
+              <a:ln>
+                <a:noFill/>
+              </a:ln>
+              <a:solidFill>
+                <a:prstClr val="white"/>
+              </a:solidFill>
+              <a:effectLst/>
+              <a:uLnTx/>
+              <a:uFillTx/>
+              <a:latin typeface="+mn-lt"/>
+              <a:ea typeface="+mn-ea"/>
+              <a:cs typeface="Calibri" panose="020F0502020204030204" pitchFamily="34" charset="0"/>
+            </a:endParaRPr>
+          </a:p>
+        </p:txBody>
+      </p:sp>
+      <p:sp>
+        <p:nvSpPr>
+          <p:cNvPr id="14" name="椭圆 13"/>
+          <p:cNvSpPr/>
+          <p:nvPr/>
+        </p:nvSpPr>
+        <p:spPr>
+          <a:xfrm>
+            <a:off x="3871913" y="2357438"/>
+            <a:ext cx="247650" cy="249238"/>
+          </a:xfrm>
+          <a:prstGeom prst="ellipse">
+            <a:avLst/>
+          </a:prstGeom>
+          <a:solidFill>
+            <a:srgbClr val="02B3C5"/>
+          </a:solidFill>
+          <a:ln w="28575">
+            <a:solidFill>
+              <a:schemeClr val="bg1"/>
+            </a:solidFill>
+          </a:ln>
+          <a:effectLst>
+            <a:outerShdw blurRad="152400" dist="63500" dir="8100000" algn="tr" rotWithShape="0">
+              <a:prstClr val="black">
+                <a:alpha val="26000"/>
+              </a:prstClr>
+            </a:outerShdw>
+          </a:effectLst>
+        </p:spPr>
+        <p:style>
+          <a:lnRef idx="2">
+            <a:schemeClr val="accent1">
+              <a:shade val="50000"/>
+            </a:schemeClr>
+          </a:lnRef>
+          <a:fillRef idx="1">
+            <a:schemeClr val="accent1"/>
+          </a:fillRef>
+          <a:effectRef idx="0">
+            <a:schemeClr val="accent1"/>
+          </a:effectRef>
+          <a:fontRef idx="minor">
+            <a:schemeClr val="lt1"/>
+          </a:fontRef>
+        </p:style>
+        <p:txBody>
+          <a:bodyPr wrap="square" rtlCol="0" anchor="ctr">
+            <a:noAutofit/>
+          </a:bodyPr>
+          <a:lstStyle/>
+          <a:p>
+            <a:pPr marL="0" marR="0" lvl="0" indent="0" algn="ctr" defTabSz="914400" rtl="0" eaLnBrk="1" fontAlgn="auto" latinLnBrk="0" hangingPunct="1">
+              <a:lnSpc>
+                <a:spcPct val="100000"/>
+              </a:lnSpc>
+              <a:spcBef>
+                <a:spcPts val="0"/>
+              </a:spcBef>
+              <a:spcAft>
+                <a:spcPts val="0"/>
+              </a:spcAft>
+              <a:buClrTx/>
+              <a:buSzTx/>
+              <a:buFontTx/>
+              <a:buNone/>
+              <a:defRPr/>
+            </a:pPr>
+            <a:endParaRPr kumimoji="0" lang="zh-CN" altLang="en-US" sz="3190" b="0" i="0" u="none" strike="noStrike" kern="1200" cap="none" spc="0" normalizeH="0" baseline="0" noProof="0">
+              <a:ln>
+                <a:noFill/>
+              </a:ln>
+              <a:solidFill>
+                <a:prstClr val="white"/>
+              </a:solidFill>
+              <a:effectLst/>
+              <a:uLnTx/>
+              <a:uFillTx/>
+              <a:latin typeface="+mn-lt"/>
+              <a:ea typeface="+mn-ea"/>
+              <a:cs typeface="Calibri" panose="020F0502020204030204" pitchFamily="34" charset="0"/>
+            </a:endParaRPr>
+          </a:p>
+        </p:txBody>
+      </p:sp>
+      <p:sp>
+        <p:nvSpPr>
+          <p:cNvPr id="15" name="椭圆 14"/>
+          <p:cNvSpPr/>
+          <p:nvPr/>
+        </p:nvSpPr>
+        <p:spPr>
+          <a:xfrm>
+            <a:off x="3381375" y="2170113"/>
+            <a:ext cx="187325" cy="187325"/>
+          </a:xfrm>
+          <a:prstGeom prst="ellipse">
+            <a:avLst/>
+          </a:prstGeom>
+          <a:solidFill>
+            <a:srgbClr val="6A3C7C"/>
+          </a:solidFill>
+          <a:ln w="28575">
+            <a:solidFill>
+              <a:schemeClr val="bg1"/>
+            </a:solidFill>
+          </a:ln>
+          <a:effectLst>
+            <a:outerShdw blurRad="152400" dist="63500" dir="8100000" algn="tr" rotWithShape="0">
+              <a:prstClr val="black">
+                <a:alpha val="26000"/>
+              </a:prstClr>
+            </a:outerShdw>
+          </a:effectLst>
+        </p:spPr>
+        <p:style>
+          <a:lnRef idx="2">
+            <a:schemeClr val="accent1">
+              <a:shade val="50000"/>
+            </a:schemeClr>
+          </a:lnRef>
+          <a:fillRef idx="1">
+            <a:schemeClr val="accent1"/>
+          </a:fillRef>
+          <a:effectRef idx="0">
+            <a:schemeClr val="accent1"/>
+          </a:effectRef>
+          <a:fontRef idx="minor">
+            <a:schemeClr val="lt1"/>
+          </a:fontRef>
+        </p:style>
+        <p:txBody>
+          <a:bodyPr wrap="square" rtlCol="0" anchor="ctr">
+            <a:noAutofit/>
+          </a:bodyPr>
+          <a:lstStyle/>
+          <a:p>
+            <a:pPr marL="0" marR="0" lvl="0" indent="0" algn="ctr" defTabSz="914400" rtl="0" eaLnBrk="1" fontAlgn="auto" latinLnBrk="0" hangingPunct="1">
+              <a:lnSpc>
+                <a:spcPct val="100000"/>
+              </a:lnSpc>
+              <a:spcBef>
+                <a:spcPts val="0"/>
+              </a:spcBef>
+              <a:spcAft>
+                <a:spcPts val="0"/>
+              </a:spcAft>
+              <a:buClrTx/>
+              <a:buSzTx/>
+              <a:buFontTx/>
+              <a:buNone/>
+              <a:defRPr/>
+            </a:pPr>
+            <a:endParaRPr kumimoji="0" lang="zh-CN" altLang="en-US" sz="3190" b="0" i="0" u="none" strike="noStrike" kern="1200" cap="none" spc="0" normalizeH="0" baseline="0" noProof="0">
+              <a:ln>
+                <a:noFill/>
+              </a:ln>
+              <a:solidFill>
+                <a:prstClr val="white"/>
+              </a:solidFill>
+              <a:effectLst/>
+              <a:uLnTx/>
+              <a:uFillTx/>
+              <a:latin typeface="+mn-lt"/>
+              <a:ea typeface="+mn-ea"/>
+              <a:cs typeface="Calibri" panose="020F0502020204030204" pitchFamily="34" charset="0"/>
+            </a:endParaRPr>
+          </a:p>
+        </p:txBody>
+      </p:sp>
+      <p:sp>
+        <p:nvSpPr>
+          <p:cNvPr id="14345" name="文本框 15"/>
+          <p:cNvSpPr txBox="1"/>
+          <p:nvPr/>
+        </p:nvSpPr>
+        <p:spPr>
+          <a:xfrm>
+            <a:off x="4370070" y="2808605"/>
+            <a:ext cx="3583940" cy="1198880"/>
+          </a:xfrm>
+          <a:prstGeom prst="rect">
+            <a:avLst/>
+          </a:prstGeom>
+          <a:noFill/>
+          <a:ln w="9525">
+            <a:noFill/>
+          </a:ln>
+        </p:spPr>
+        <p:txBody>
+          <a:bodyPr wrap="square" anchor="t">
+            <a:spAutoFit/>
+          </a:bodyPr>
+          <a:p>
+            <a:pPr algn="ctr"/>
+            <a:r>
+              <a:rPr lang="en-US" sz="7200" dirty="0">
+                <a:solidFill>
+                  <a:schemeClr val="bg1"/>
+                </a:solidFill>
+                <a:ea typeface="SimSun" panose="02010600030101010101" pitchFamily="2" charset="-122"/>
+                <a:cs typeface="Calibri" panose="020F0502020204030204" pitchFamily="34" charset="0"/>
+              </a:rPr>
+              <a:t>Concluzii</a:t>
+            </a:r>
+            <a:endParaRPr lang="en-US" sz="7200" dirty="0">
+              <a:solidFill>
+                <a:schemeClr val="bg1"/>
+              </a:solidFill>
+              <a:ea typeface="SimSun" panose="02010600030101010101" pitchFamily="2" charset="-122"/>
+              <a:cs typeface="Calibri" panose="020F0502020204030204" pitchFamily="34" charset="0"/>
+            </a:endParaRPr>
+          </a:p>
+        </p:txBody>
+      </p:sp>
+    </p:spTree>
+  </p:cSld>
+  <p:clrMapOvr>
+    <a:masterClrMapping/>
+  </p:clrMapOvr>
+</p:sld>
+</file>
+
+<file path=ppt/slides/slide21.xml><?xml version="1.0" encoding="utf-8"?>
+<p:sld xmlns:a="http://schemas.openxmlformats.org/drawingml/2006/main" xmlns:r="http://schemas.openxmlformats.org/officeDocument/2006/relationships" xmlns:p="http://schemas.openxmlformats.org/presentationml/2006/main">
+  <p:cSld>
+    <p:spTree>
+      <p:nvGrpSpPr>
+        <p:cNvPr id="1" name=""/>
+        <p:cNvGrpSpPr/>
+        <p:nvPr/>
+      </p:nvGrpSpPr>
+      <p:grpSpPr/>
+      <p:sp>
+        <p:nvSpPr>
+          <p:cNvPr id="4" name="椭圆 3"/>
+          <p:cNvSpPr/>
+          <p:nvPr/>
+        </p:nvSpPr>
+        <p:spPr>
+          <a:xfrm>
+            <a:off x="8351838" y="4391025"/>
+            <a:ext cx="841375" cy="841375"/>
+          </a:xfrm>
+          <a:prstGeom prst="ellipse">
+            <a:avLst/>
+          </a:prstGeom>
+          <a:solidFill>
+            <a:srgbClr val="6A3C7C"/>
+          </a:solidFill>
+          <a:ln w="28575">
+            <a:solidFill>
+              <a:schemeClr val="bg1"/>
+            </a:solidFill>
+          </a:ln>
+          <a:effectLst>
+            <a:outerShdw blurRad="152400" dist="63500" dir="8100000" algn="tr" rotWithShape="0">
+              <a:prstClr val="black">
+                <a:alpha val="26000"/>
+              </a:prstClr>
+            </a:outerShdw>
+          </a:effectLst>
+        </p:spPr>
+        <p:style>
+          <a:lnRef idx="2">
+            <a:schemeClr val="accent1">
+              <a:shade val="50000"/>
+            </a:schemeClr>
+          </a:lnRef>
+          <a:fillRef idx="1">
+            <a:schemeClr val="accent1"/>
+          </a:fillRef>
+          <a:effectRef idx="0">
+            <a:schemeClr val="accent1"/>
+          </a:effectRef>
+          <a:fontRef idx="minor">
+            <a:schemeClr val="lt1"/>
+          </a:fontRef>
+        </p:style>
+        <p:txBody>
+          <a:bodyPr wrap="square" rtlCol="0" anchor="ctr">
+            <a:noAutofit/>
+          </a:bodyPr>
+          <a:lstStyle/>
+          <a:p>
+            <a:pPr marL="0" marR="0" lvl="0" indent="0" algn="ctr" defTabSz="914400" rtl="0" eaLnBrk="1" fontAlgn="auto" latinLnBrk="0" hangingPunct="1">
+              <a:lnSpc>
+                <a:spcPct val="100000"/>
+              </a:lnSpc>
+              <a:spcBef>
+                <a:spcPts val="0"/>
+              </a:spcBef>
+              <a:spcAft>
+                <a:spcPts val="0"/>
+              </a:spcAft>
+              <a:buClrTx/>
+              <a:buSzTx/>
+              <a:buFontTx/>
+              <a:buNone/>
+              <a:defRPr/>
+            </a:pPr>
+            <a:endParaRPr kumimoji="0" lang="zh-CN" altLang="en-US" sz="3190" b="0" i="0" u="none" strike="noStrike" kern="1200" cap="none" spc="0" normalizeH="0" baseline="0" noProof="0">
+              <a:ln>
+                <a:noFill/>
+              </a:ln>
+              <a:solidFill>
+                <a:prstClr val="white"/>
+              </a:solidFill>
+              <a:effectLst/>
+              <a:uLnTx/>
+              <a:uFillTx/>
+              <a:latin typeface="+mn-lt"/>
+              <a:ea typeface="+mn-ea"/>
+              <a:cs typeface="Calibri" panose="020F0502020204030204" pitchFamily="34" charset="0"/>
+            </a:endParaRPr>
+          </a:p>
+        </p:txBody>
+      </p:sp>
+      <p:sp>
+        <p:nvSpPr>
+          <p:cNvPr id="6" name="椭圆 5"/>
+          <p:cNvSpPr/>
+          <p:nvPr/>
+        </p:nvSpPr>
+        <p:spPr>
+          <a:xfrm>
+            <a:off x="8923338" y="4132263"/>
+            <a:ext cx="517525" cy="517525"/>
+          </a:xfrm>
+          <a:prstGeom prst="ellipse">
+            <a:avLst/>
+          </a:prstGeom>
+          <a:solidFill>
+            <a:srgbClr val="FFBF53"/>
+          </a:solidFill>
+          <a:ln w="28575">
+            <a:solidFill>
+              <a:schemeClr val="bg1"/>
+            </a:solidFill>
+          </a:ln>
+          <a:effectLst>
+            <a:outerShdw blurRad="152400" dist="63500" dir="8100000" algn="tr" rotWithShape="0">
+              <a:prstClr val="black">
+                <a:alpha val="26000"/>
+              </a:prstClr>
+            </a:outerShdw>
+          </a:effectLst>
+        </p:spPr>
+        <p:style>
+          <a:lnRef idx="2">
+            <a:schemeClr val="accent1">
+              <a:shade val="50000"/>
+            </a:schemeClr>
+          </a:lnRef>
+          <a:fillRef idx="1">
+            <a:schemeClr val="accent1"/>
+          </a:fillRef>
+          <a:effectRef idx="0">
+            <a:schemeClr val="accent1"/>
+          </a:effectRef>
+          <a:fontRef idx="minor">
+            <a:schemeClr val="lt1"/>
+          </a:fontRef>
+        </p:style>
+        <p:txBody>
+          <a:bodyPr wrap="square" rtlCol="0" anchor="ctr">
+            <a:noAutofit/>
+          </a:bodyPr>
+          <a:lstStyle/>
+          <a:p>
+            <a:pPr marL="0" marR="0" lvl="0" indent="0" algn="ctr" defTabSz="914400" rtl="0" eaLnBrk="1" fontAlgn="auto" latinLnBrk="0" hangingPunct="1">
+              <a:lnSpc>
+                <a:spcPct val="100000"/>
+              </a:lnSpc>
+              <a:spcBef>
+                <a:spcPts val="0"/>
+              </a:spcBef>
+              <a:spcAft>
+                <a:spcPts val="0"/>
+              </a:spcAft>
+              <a:buClrTx/>
+              <a:buSzTx/>
+              <a:buFontTx/>
+              <a:buNone/>
+              <a:defRPr/>
+            </a:pPr>
+            <a:endParaRPr kumimoji="0" lang="zh-CN" altLang="en-US" sz="3190" b="0" i="0" u="none" strike="noStrike" kern="1200" cap="none" spc="0" normalizeH="0" baseline="0" noProof="0">
+              <a:ln>
+                <a:noFill/>
+              </a:ln>
+              <a:solidFill>
+                <a:prstClr val="white"/>
+              </a:solidFill>
+              <a:effectLst/>
+              <a:uLnTx/>
+              <a:uFillTx/>
+              <a:latin typeface="+mn-lt"/>
+              <a:ea typeface="+mn-ea"/>
+              <a:cs typeface="Calibri" panose="020F0502020204030204" pitchFamily="34" charset="0"/>
+            </a:endParaRPr>
+          </a:p>
+        </p:txBody>
+      </p:sp>
+      <p:sp>
+        <p:nvSpPr>
+          <p:cNvPr id="7" name="椭圆 6"/>
+          <p:cNvSpPr/>
+          <p:nvPr/>
+        </p:nvSpPr>
+        <p:spPr>
+          <a:xfrm>
+            <a:off x="8178800" y="3921125"/>
+            <a:ext cx="346075" cy="346075"/>
+          </a:xfrm>
+          <a:prstGeom prst="ellipse">
+            <a:avLst/>
+          </a:prstGeom>
+          <a:solidFill>
+            <a:srgbClr val="F07474"/>
+          </a:solidFill>
+          <a:ln w="28575">
+            <a:solidFill>
+              <a:schemeClr val="bg1"/>
+            </a:solidFill>
+          </a:ln>
+          <a:effectLst>
+            <a:outerShdw blurRad="152400" dist="63500" dir="8100000" algn="tr" rotWithShape="0">
+              <a:prstClr val="black">
+                <a:alpha val="26000"/>
+              </a:prstClr>
+            </a:outerShdw>
+          </a:effectLst>
+        </p:spPr>
+        <p:style>
+          <a:lnRef idx="2">
+            <a:schemeClr val="accent1">
+              <a:shade val="50000"/>
+            </a:schemeClr>
+          </a:lnRef>
+          <a:fillRef idx="1">
+            <a:schemeClr val="accent1"/>
+          </a:fillRef>
+          <a:effectRef idx="0">
+            <a:schemeClr val="accent1"/>
+          </a:effectRef>
+          <a:fontRef idx="minor">
+            <a:schemeClr val="lt1"/>
+          </a:fontRef>
+        </p:style>
+        <p:txBody>
+          <a:bodyPr wrap="square" rtlCol="0" anchor="ctr">
+            <a:noAutofit/>
+          </a:bodyPr>
+          <a:lstStyle/>
+          <a:p>
+            <a:pPr marL="0" marR="0" lvl="0" indent="0" algn="ctr" defTabSz="914400" rtl="0" eaLnBrk="1" fontAlgn="auto" latinLnBrk="0" hangingPunct="1">
+              <a:lnSpc>
+                <a:spcPct val="100000"/>
+              </a:lnSpc>
+              <a:spcBef>
+                <a:spcPts val="0"/>
+              </a:spcBef>
+              <a:spcAft>
+                <a:spcPts val="0"/>
+              </a:spcAft>
+              <a:buClrTx/>
+              <a:buSzTx/>
+              <a:buFontTx/>
+              <a:buNone/>
+              <a:defRPr/>
+            </a:pPr>
+            <a:endParaRPr kumimoji="0" lang="zh-CN" altLang="en-US" sz="3190" b="0" i="0" u="none" strike="noStrike" kern="1200" cap="none" spc="0" normalizeH="0" baseline="0" noProof="0">
+              <a:ln>
+                <a:noFill/>
+              </a:ln>
+              <a:solidFill>
+                <a:prstClr val="white"/>
+              </a:solidFill>
+              <a:effectLst/>
+              <a:uLnTx/>
+              <a:uFillTx/>
+              <a:latin typeface="+mn-lt"/>
+              <a:ea typeface="+mn-ea"/>
+              <a:cs typeface="Calibri" panose="020F0502020204030204" pitchFamily="34" charset="0"/>
+            </a:endParaRPr>
+          </a:p>
+        </p:txBody>
+      </p:sp>
+      <p:sp>
+        <p:nvSpPr>
+          <p:cNvPr id="12" name="椭圆 11"/>
+          <p:cNvSpPr/>
+          <p:nvPr/>
+        </p:nvSpPr>
+        <p:spPr>
+          <a:xfrm>
+            <a:off x="4205288" y="1533525"/>
+            <a:ext cx="3748088" cy="3748088"/>
+          </a:xfrm>
+          <a:prstGeom prst="ellipse">
+            <a:avLst/>
+          </a:prstGeom>
+          <a:solidFill>
+            <a:srgbClr val="F07474"/>
+          </a:solidFill>
+          <a:ln w="28575">
+            <a:solidFill>
+              <a:schemeClr val="bg1"/>
+            </a:solidFill>
+          </a:ln>
+          <a:effectLst>
+            <a:outerShdw blurRad="152400" dist="63500" dir="8100000" algn="tr" rotWithShape="0">
+              <a:prstClr val="black">
+                <a:alpha val="26000"/>
+              </a:prstClr>
+            </a:outerShdw>
+          </a:effectLst>
+        </p:spPr>
+        <p:style>
+          <a:lnRef idx="2">
+            <a:schemeClr val="accent1">
+              <a:shade val="50000"/>
+            </a:schemeClr>
+          </a:lnRef>
+          <a:fillRef idx="1">
+            <a:schemeClr val="accent1"/>
+          </a:fillRef>
+          <a:effectRef idx="0">
+            <a:schemeClr val="accent1"/>
+          </a:effectRef>
+          <a:fontRef idx="minor">
+            <a:schemeClr val="lt1"/>
+          </a:fontRef>
+        </p:style>
+        <p:txBody>
+          <a:bodyPr wrap="square" rtlCol="0" anchor="ctr">
+            <a:noAutofit/>
+          </a:bodyPr>
+          <a:lstStyle/>
+          <a:p>
+            <a:pPr marL="0" marR="0" lvl="0" indent="0" algn="ctr" defTabSz="914400" rtl="0" eaLnBrk="1" fontAlgn="auto" latinLnBrk="0" hangingPunct="1">
+              <a:lnSpc>
+                <a:spcPct val="100000"/>
+              </a:lnSpc>
+              <a:spcBef>
+                <a:spcPts val="0"/>
+              </a:spcBef>
+              <a:spcAft>
+                <a:spcPts val="0"/>
+              </a:spcAft>
+              <a:buClrTx/>
+              <a:buSzTx/>
+              <a:buFontTx/>
+              <a:buNone/>
+              <a:defRPr/>
+            </a:pPr>
+            <a:endParaRPr kumimoji="0" lang="zh-CN" altLang="en-US" sz="3190" b="0" i="0" u="none" strike="noStrike" kern="1200" cap="none" spc="0" normalizeH="0" baseline="0" noProof="0">
+              <a:ln>
+                <a:noFill/>
+              </a:ln>
+              <a:solidFill>
+                <a:prstClr val="white"/>
+              </a:solidFill>
+              <a:effectLst/>
+              <a:uLnTx/>
+              <a:uFillTx/>
+              <a:latin typeface="+mn-lt"/>
+              <a:ea typeface="+mn-ea"/>
+              <a:cs typeface="Calibri" panose="020F0502020204030204" pitchFamily="34" charset="0"/>
+            </a:endParaRPr>
+          </a:p>
+        </p:txBody>
+      </p:sp>
+      <p:sp>
+        <p:nvSpPr>
+          <p:cNvPr id="5" name="椭圆 4"/>
+          <p:cNvSpPr/>
+          <p:nvPr/>
+        </p:nvSpPr>
+        <p:spPr>
+          <a:xfrm>
+            <a:off x="7480300" y="4310063"/>
+            <a:ext cx="601663" cy="603250"/>
+          </a:xfrm>
+          <a:prstGeom prst="ellipse">
+            <a:avLst/>
+          </a:prstGeom>
+          <a:solidFill>
+            <a:srgbClr val="02B3C5"/>
+          </a:solidFill>
+          <a:ln w="28575">
+            <a:solidFill>
+              <a:schemeClr val="bg1"/>
+            </a:solidFill>
+          </a:ln>
+          <a:effectLst>
+            <a:outerShdw blurRad="152400" dist="63500" dir="8100000" algn="tr" rotWithShape="0">
+              <a:prstClr val="black">
+                <a:alpha val="26000"/>
+              </a:prstClr>
+            </a:outerShdw>
+          </a:effectLst>
+        </p:spPr>
+        <p:style>
+          <a:lnRef idx="2">
+            <a:schemeClr val="accent1">
+              <a:shade val="50000"/>
+            </a:schemeClr>
+          </a:lnRef>
+          <a:fillRef idx="1">
+            <a:schemeClr val="accent1"/>
+          </a:fillRef>
+          <a:effectRef idx="0">
+            <a:schemeClr val="accent1"/>
+          </a:effectRef>
+          <a:fontRef idx="minor">
+            <a:schemeClr val="lt1"/>
+          </a:fontRef>
+        </p:style>
+        <p:txBody>
+          <a:bodyPr wrap="square" rtlCol="0" anchor="ctr">
+            <a:noAutofit/>
+          </a:bodyPr>
+          <a:lstStyle/>
+          <a:p>
+            <a:pPr marL="0" marR="0" lvl="0" indent="0" algn="ctr" defTabSz="914400" rtl="0" eaLnBrk="1" fontAlgn="auto" latinLnBrk="0" hangingPunct="1">
+              <a:lnSpc>
+                <a:spcPct val="100000"/>
+              </a:lnSpc>
+              <a:spcBef>
+                <a:spcPts val="0"/>
+              </a:spcBef>
+              <a:spcAft>
+                <a:spcPts val="0"/>
+              </a:spcAft>
+              <a:buClrTx/>
+              <a:buSzTx/>
+              <a:buFontTx/>
+              <a:buNone/>
+              <a:defRPr/>
+            </a:pPr>
+            <a:endParaRPr kumimoji="0" lang="zh-CN" altLang="en-US" sz="3190" b="0" i="0" u="none" strike="noStrike" kern="1200" cap="none" spc="0" normalizeH="0" baseline="0" noProof="0">
+              <a:ln>
+                <a:noFill/>
+              </a:ln>
+              <a:solidFill>
+                <a:prstClr val="white"/>
+              </a:solidFill>
+              <a:effectLst/>
+              <a:uLnTx/>
+              <a:uFillTx/>
+              <a:latin typeface="+mn-lt"/>
+              <a:ea typeface="+mn-ea"/>
+              <a:cs typeface="Calibri" panose="020F0502020204030204" pitchFamily="34" charset="0"/>
+            </a:endParaRPr>
+          </a:p>
+        </p:txBody>
+      </p:sp>
+      <p:sp>
+        <p:nvSpPr>
+          <p:cNvPr id="13" name="椭圆 12"/>
+          <p:cNvSpPr/>
+          <p:nvPr/>
+        </p:nvSpPr>
+        <p:spPr>
+          <a:xfrm>
+            <a:off x="3606800" y="1685925"/>
+            <a:ext cx="528638" cy="528638"/>
+          </a:xfrm>
+          <a:prstGeom prst="ellipse">
+            <a:avLst/>
+          </a:prstGeom>
+          <a:solidFill>
+            <a:srgbClr val="F07474"/>
+          </a:solidFill>
+          <a:ln w="28575">
+            <a:solidFill>
+              <a:schemeClr val="bg1"/>
+            </a:solidFill>
+          </a:ln>
+          <a:effectLst>
+            <a:outerShdw blurRad="152400" dist="63500" dir="8100000" algn="tr" rotWithShape="0">
+              <a:prstClr val="black">
+                <a:alpha val="26000"/>
+              </a:prstClr>
+            </a:outerShdw>
+          </a:effectLst>
+        </p:spPr>
+        <p:style>
+          <a:lnRef idx="2">
+            <a:schemeClr val="accent1">
+              <a:shade val="50000"/>
+            </a:schemeClr>
+          </a:lnRef>
+          <a:fillRef idx="1">
+            <a:schemeClr val="accent1"/>
+          </a:fillRef>
+          <a:effectRef idx="0">
+            <a:schemeClr val="accent1"/>
+          </a:effectRef>
+          <a:fontRef idx="minor">
+            <a:schemeClr val="lt1"/>
+          </a:fontRef>
+        </p:style>
+        <p:txBody>
+          <a:bodyPr wrap="square" rtlCol="0" anchor="ctr">
+            <a:noAutofit/>
+          </a:bodyPr>
+          <a:lstStyle/>
+          <a:p>
+            <a:pPr marL="0" marR="0" lvl="0" indent="0" algn="ctr" defTabSz="914400" rtl="0" eaLnBrk="1" fontAlgn="auto" latinLnBrk="0" hangingPunct="1">
+              <a:lnSpc>
+                <a:spcPct val="100000"/>
+              </a:lnSpc>
+              <a:spcBef>
+                <a:spcPts val="0"/>
+              </a:spcBef>
+              <a:spcAft>
+                <a:spcPts val="0"/>
+              </a:spcAft>
+              <a:buClrTx/>
+              <a:buSzTx/>
+              <a:buFontTx/>
+              <a:buNone/>
+              <a:defRPr/>
+            </a:pPr>
+            <a:endParaRPr kumimoji="0" lang="zh-CN" altLang="en-US" sz="3190" b="0" i="0" u="none" strike="noStrike" kern="1200" cap="none" spc="0" normalizeH="0" baseline="0" noProof="0">
+              <a:ln>
+                <a:noFill/>
+              </a:ln>
+              <a:solidFill>
+                <a:prstClr val="white"/>
+              </a:solidFill>
+              <a:effectLst/>
+              <a:uLnTx/>
+              <a:uFillTx/>
+              <a:latin typeface="+mn-lt"/>
+              <a:ea typeface="+mn-ea"/>
+              <a:cs typeface="Calibri" panose="020F0502020204030204" pitchFamily="34" charset="0"/>
+            </a:endParaRPr>
+          </a:p>
+        </p:txBody>
+      </p:sp>
+      <p:sp>
+        <p:nvSpPr>
+          <p:cNvPr id="14" name="椭圆 13"/>
+          <p:cNvSpPr/>
+          <p:nvPr/>
+        </p:nvSpPr>
+        <p:spPr>
+          <a:xfrm>
+            <a:off x="3871913" y="2357438"/>
+            <a:ext cx="247650" cy="249238"/>
+          </a:xfrm>
+          <a:prstGeom prst="ellipse">
+            <a:avLst/>
+          </a:prstGeom>
+          <a:solidFill>
+            <a:srgbClr val="02B3C5"/>
+          </a:solidFill>
+          <a:ln w="28575">
+            <a:solidFill>
+              <a:schemeClr val="bg1"/>
+            </a:solidFill>
+          </a:ln>
+          <a:effectLst>
+            <a:outerShdw blurRad="152400" dist="63500" dir="8100000" algn="tr" rotWithShape="0">
+              <a:prstClr val="black">
+                <a:alpha val="26000"/>
+              </a:prstClr>
+            </a:outerShdw>
+          </a:effectLst>
+        </p:spPr>
+        <p:style>
+          <a:lnRef idx="2">
+            <a:schemeClr val="accent1">
+              <a:shade val="50000"/>
+            </a:schemeClr>
+          </a:lnRef>
+          <a:fillRef idx="1">
+            <a:schemeClr val="accent1"/>
+          </a:fillRef>
+          <a:effectRef idx="0">
+            <a:schemeClr val="accent1"/>
+          </a:effectRef>
+          <a:fontRef idx="minor">
+            <a:schemeClr val="lt1"/>
+          </a:fontRef>
+        </p:style>
+        <p:txBody>
+          <a:bodyPr wrap="square" rtlCol="0" anchor="ctr">
+            <a:noAutofit/>
+          </a:bodyPr>
+          <a:lstStyle/>
+          <a:p>
+            <a:pPr marL="0" marR="0" lvl="0" indent="0" algn="ctr" defTabSz="914400" rtl="0" eaLnBrk="1" fontAlgn="auto" latinLnBrk="0" hangingPunct="1">
+              <a:lnSpc>
+                <a:spcPct val="100000"/>
+              </a:lnSpc>
+              <a:spcBef>
+                <a:spcPts val="0"/>
+              </a:spcBef>
+              <a:spcAft>
+                <a:spcPts val="0"/>
+              </a:spcAft>
+              <a:buClrTx/>
+              <a:buSzTx/>
+              <a:buFontTx/>
+              <a:buNone/>
+              <a:defRPr/>
+            </a:pPr>
+            <a:endParaRPr kumimoji="0" lang="zh-CN" altLang="en-US" sz="3190" b="0" i="0" u="none" strike="noStrike" kern="1200" cap="none" spc="0" normalizeH="0" baseline="0" noProof="0">
+              <a:ln>
+                <a:noFill/>
+              </a:ln>
+              <a:solidFill>
+                <a:prstClr val="white"/>
+              </a:solidFill>
+              <a:effectLst/>
+              <a:uLnTx/>
+              <a:uFillTx/>
+              <a:latin typeface="+mn-lt"/>
+              <a:ea typeface="+mn-ea"/>
+              <a:cs typeface="Calibri" panose="020F0502020204030204" pitchFamily="34" charset="0"/>
+            </a:endParaRPr>
+          </a:p>
+        </p:txBody>
+      </p:sp>
+      <p:sp>
+        <p:nvSpPr>
+          <p:cNvPr id="15" name="椭圆 14"/>
+          <p:cNvSpPr/>
+          <p:nvPr/>
+        </p:nvSpPr>
+        <p:spPr>
+          <a:xfrm>
+            <a:off x="3381375" y="2170113"/>
+            <a:ext cx="187325" cy="187325"/>
+          </a:xfrm>
+          <a:prstGeom prst="ellipse">
+            <a:avLst/>
+          </a:prstGeom>
+          <a:solidFill>
+            <a:srgbClr val="6A3C7C"/>
+          </a:solidFill>
+          <a:ln w="28575">
+            <a:solidFill>
+              <a:schemeClr val="bg1"/>
+            </a:solidFill>
+          </a:ln>
+          <a:effectLst>
+            <a:outerShdw blurRad="152400" dist="63500" dir="8100000" algn="tr" rotWithShape="0">
+              <a:prstClr val="black">
+                <a:alpha val="26000"/>
+              </a:prstClr>
+            </a:outerShdw>
+          </a:effectLst>
+        </p:spPr>
+        <p:style>
+          <a:lnRef idx="2">
+            <a:schemeClr val="accent1">
+              <a:shade val="50000"/>
+            </a:schemeClr>
+          </a:lnRef>
+          <a:fillRef idx="1">
+            <a:schemeClr val="accent1"/>
+          </a:fillRef>
+          <a:effectRef idx="0">
+            <a:schemeClr val="accent1"/>
+          </a:effectRef>
+          <a:fontRef idx="minor">
+            <a:schemeClr val="lt1"/>
+          </a:fontRef>
+        </p:style>
+        <p:txBody>
+          <a:bodyPr wrap="square" rtlCol="0" anchor="ctr">
+            <a:noAutofit/>
+          </a:bodyPr>
+          <a:lstStyle/>
+          <a:p>
+            <a:pPr marL="0" marR="0" lvl="0" indent="0" algn="ctr" defTabSz="914400" rtl="0" eaLnBrk="1" fontAlgn="auto" latinLnBrk="0" hangingPunct="1">
+              <a:lnSpc>
+                <a:spcPct val="100000"/>
+              </a:lnSpc>
+              <a:spcBef>
+                <a:spcPts val="0"/>
+              </a:spcBef>
+              <a:spcAft>
+                <a:spcPts val="0"/>
+              </a:spcAft>
+              <a:buClrTx/>
+              <a:buSzTx/>
+              <a:buFontTx/>
+              <a:buNone/>
+              <a:defRPr/>
+            </a:pPr>
+            <a:endParaRPr kumimoji="0" lang="zh-CN" altLang="en-US" sz="3190" b="0" i="0" u="none" strike="noStrike" kern="1200" cap="none" spc="0" normalizeH="0" baseline="0" noProof="0">
+              <a:ln>
+                <a:noFill/>
+              </a:ln>
+              <a:solidFill>
+                <a:prstClr val="white"/>
+              </a:solidFill>
+              <a:effectLst/>
+              <a:uLnTx/>
+              <a:uFillTx/>
+              <a:latin typeface="+mn-lt"/>
+              <a:ea typeface="+mn-ea"/>
+              <a:cs typeface="Calibri" panose="020F0502020204030204" pitchFamily="34" charset="0"/>
+            </a:endParaRPr>
+          </a:p>
+        </p:txBody>
+      </p:sp>
+      <p:sp>
+        <p:nvSpPr>
+          <p:cNvPr id="14345" name="文本框 15"/>
+          <p:cNvSpPr txBox="1"/>
+          <p:nvPr/>
+        </p:nvSpPr>
+        <p:spPr>
+          <a:xfrm>
+            <a:off x="4525645" y="2607310"/>
+            <a:ext cx="3140710" cy="1938020"/>
+          </a:xfrm>
+          <a:prstGeom prst="rect">
+            <a:avLst/>
+          </a:prstGeom>
+          <a:noFill/>
+          <a:ln w="9525">
+            <a:noFill/>
+          </a:ln>
+        </p:spPr>
+        <p:txBody>
+          <a:bodyPr wrap="square" anchor="t">
+            <a:spAutoFit/>
+          </a:bodyPr>
+          <a:p>
+            <a:pPr algn="ctr"/>
+            <a:r>
+              <a:rPr lang="en-US" sz="4000" dirty="0">
+                <a:solidFill>
+                  <a:schemeClr val="bg1"/>
+                </a:solidFill>
+                <a:ea typeface="SimSun" panose="02010600030101010101" pitchFamily="2" charset="-122"/>
+                <a:cs typeface="Calibri" panose="020F0502020204030204" pitchFamily="34" charset="0"/>
+              </a:rPr>
+              <a:t>Bibliografie si surse recomandate</a:t>
+            </a:r>
+            <a:endParaRPr lang="en-US" sz="4000" dirty="0">
+              <a:solidFill>
+                <a:schemeClr val="bg1"/>
+              </a:solidFill>
+              <a:ea typeface="SimSun" panose="02010600030101010101" pitchFamily="2" charset="-122"/>
+              <a:cs typeface="Calibri" panose="020F0502020204030204" pitchFamily="34" charset="0"/>
+            </a:endParaRPr>
+          </a:p>
+        </p:txBody>
+      </p:sp>
+    </p:spTree>
+  </p:cSld>
+  <p:clrMapOvr>
+    <a:masterClrMapping/>
+  </p:clrMapOvr>
+</p:sld>
+</file>
+
+<file path=ppt/slides/slide22.xml><?xml version="1.0" encoding="utf-8"?>
+<p:sld xmlns:a="http://schemas.openxmlformats.org/drawingml/2006/main" xmlns:r="http://schemas.openxmlformats.org/officeDocument/2006/relationships" xmlns:p="http://schemas.openxmlformats.org/presentationml/2006/main">
+  <p:cSld>
+    <p:spTree>
+      <p:nvGrpSpPr>
+        <p:cNvPr id="1" name=""/>
+        <p:cNvGrpSpPr/>
+        <p:nvPr/>
+      </p:nvGrpSpPr>
+      <p:grpSpPr/>
+    </p:spTree>
+  </p:cSld>
+  <p:clrMapOvr>
+    <a:masterClrMapping/>
+  </p:clrMapOvr>
+  <p:transition/>
+</p:sld>
+</file>
+
+<file path=ppt/slides/slide23.xml><?xml version="1.0" encoding="utf-8"?>
 <p:sld xmlns:a="http://schemas.openxmlformats.org/drawingml/2006/main" xmlns:r="http://schemas.openxmlformats.org/officeDocument/2006/relationships" xmlns:p="http://schemas.openxmlformats.org/presentationml/2006/main">
   <p:cSld>
     <p:spTree>
@@ -9771,7 +10117,7 @@
 </p:sld>
 </file>
 
-<file path=ppt/slides/slide21.xml><?xml version="1.0" encoding="utf-8"?>
+<file path=ppt/slides/slide24.xml><?xml version="1.0" encoding="utf-8"?>
 <p:sld xmlns:a="http://schemas.openxmlformats.org/drawingml/2006/main" xmlns:r="http://schemas.openxmlformats.org/officeDocument/2006/relationships" xmlns:p="http://schemas.openxmlformats.org/presentationml/2006/main">
   <p:cSld>
     <p:spTree>
@@ -12638,7 +12984,7 @@
       <p:grpSpPr/>
       <p:pic>
         <p:nvPicPr>
-          <p:cNvPr id="4" name="Picture 3" descr="2021_02_23_21_11_32_Procesarea_Imaginilor_UI.fxml"/>
+          <p:cNvPr id="2" name="Picture 1" descr="2021_02_24_13_31_36_Procesarea_imaginilor"/>
           <p:cNvPicPr>
             <a:picLocks noChangeAspect="1"/>
           </p:cNvPicPr>
@@ -12652,8 +12998,8 @@
         </p:blipFill>
         <p:spPr>
           <a:xfrm>
-            <a:off x="2276475" y="614680"/>
-            <a:ext cx="7639050" cy="5038725"/>
+            <a:off x="2492375" y="909320"/>
+            <a:ext cx="7610475" cy="5038725"/>
           </a:xfrm>
           <a:prstGeom prst="rect">
             <a:avLst/>

</xml_diff>